<commit_message>
Finito testo relazione e sfondo
</commit_message>
<xml_diff>
--- a/Modelli relazione/Power C13.pptx
+++ b/Modelli relazione/Power C13.pptx
@@ -5,7 +5,7 @@
     <p:sldMasterId id="2147483660" r:id="rId1"/>
   </p:sldMasterIdLst>
   <p:notesMasterIdLst>
-    <p:notesMasterId r:id="rId16"/>
+    <p:notesMasterId r:id="rId20"/>
   </p:notesMasterIdLst>
   <p:sldIdLst>
     <p:sldId id="256" r:id="rId2"/>
@@ -21,7 +21,11 @@
     <p:sldId id="269" r:id="rId12"/>
     <p:sldId id="270" r:id="rId13"/>
     <p:sldId id="265" r:id="rId14"/>
-    <p:sldId id="266" r:id="rId15"/>
+    <p:sldId id="271" r:id="rId15"/>
+    <p:sldId id="272" r:id="rId16"/>
+    <p:sldId id="273" r:id="rId17"/>
+    <p:sldId id="274" r:id="rId18"/>
+    <p:sldId id="266" r:id="rId19"/>
   </p:sldIdLst>
   <p:sldSz cx="12192000" cy="6858000"/>
   <p:notesSz cx="6858000" cy="9144000"/>
@@ -138,6 +142,10 @@
             <p14:sldId id="269"/>
             <p14:sldId id="270"/>
             <p14:sldId id="265"/>
+            <p14:sldId id="271"/>
+            <p14:sldId id="272"/>
+            <p14:sldId id="273"/>
+            <p14:sldId id="274"/>
             <p14:sldId id="266"/>
           </p14:sldIdLst>
         </p14:section>
@@ -3459,6 +3467,14 @@
 <file path=ppt/slides/slide1.xml><?xml version="1.0" encoding="utf-8"?>
 <p:sld xmlns:a="http://schemas.openxmlformats.org/drawingml/2006/main" xmlns:r="http://schemas.openxmlformats.org/officeDocument/2006/relationships" xmlns:p="http://schemas.openxmlformats.org/presentationml/2006/main">
   <p:cSld>
+    <p:bg>
+      <p:bgPr>
+        <a:solidFill>
+          <a:schemeClr val="bg1"/>
+        </a:solidFill>
+        <a:effectLst/>
+      </p:bgPr>
+    </p:bg>
     <p:spTree>
       <p:nvGrpSpPr>
         <p:cNvPr id="1" name=""/>
@@ -4125,8 +4141,12 @@
               </a:lnSpc>
             </a:pPr>
             <a:r>
+              <a:rPr lang="it-IT" u="sng" dirty="0"/>
+              <a:t>Imporre il punto iniziale</a:t>
+            </a:r>
+            <a:r>
               <a:rPr lang="it-IT" dirty="0"/>
-              <a:t>Imporre il punto iniziale come primo punto di manovra</a:t>
+              <a:t> come primo punto di manovra</a:t>
             </a:r>
           </a:p>
           <a:p>
@@ -4137,7 +4157,11 @@
             </a:pPr>
             <a:r>
               <a:rPr lang="it-IT" dirty="0"/>
-              <a:t>Ripetere la procedura seguita precedentemente ma discretizzando soltanto l’orbita finale, trovando così una nuova orbita di trasferimento</a:t>
+              <a:t>Ripetere la procedura seguita precedentemente ma discretizzando soltanto l’orbita finale, trovando così una </a:t>
+            </a:r>
+            <a:r>
+              <a:rPr lang="it-IT" u="sng" dirty="0"/>
+              <a:t>nuova orbita di trasferimento</a:t>
             </a:r>
           </a:p>
         </p:txBody>
@@ -4224,14 +4248,13 @@
               </a:ext>
             </a:extLst>
           </a:blip>
-          <a:stretch>
-            <a:fillRect/>
-          </a:stretch>
+          <a:srcRect/>
+          <a:stretch/>
         </p:blipFill>
         <p:spPr>
           <a:xfrm>
             <a:off x="6172202" y="1006331"/>
-            <a:ext cx="5181600" cy="5236321"/>
+            <a:ext cx="5181600" cy="5236320"/>
           </a:xfrm>
         </p:spPr>
       </p:pic>
@@ -4814,14 +4837,13 @@
               </a:ext>
             </a:extLst>
           </a:blip>
-          <a:stretch>
-            <a:fillRect/>
-          </a:stretch>
+          <a:srcRect/>
+          <a:stretch/>
         </p:blipFill>
         <p:spPr>
           <a:xfrm>
             <a:off x="6172202" y="1100546"/>
-            <a:ext cx="5341664" cy="5076417"/>
+            <a:ext cx="5341663" cy="5076417"/>
           </a:xfrm>
         </p:spPr>
       </p:pic>
@@ -4942,56 +4964,364 @@
           </a:p>
         </p:txBody>
       </p:sp>
-      <p:sp>
-        <p:nvSpPr>
-          <p:cNvPr id="6" name="Segnaposto contenuto 5">
+      <mc:AlternateContent xmlns:mc="http://schemas.openxmlformats.org/markup-compatibility/2006">
+        <mc:Choice xmlns:a14="http://schemas.microsoft.com/office/drawing/2010/main" Requires="a14">
+          <p:sp>
+            <p:nvSpPr>
+              <p:cNvPr id="6" name="Segnaposto contenuto 5">
+                <a:extLst>
+                  <a:ext uri="{FF2B5EF4-FFF2-40B4-BE49-F238E27FC236}">
+                    <a16:creationId xmlns:a16="http://schemas.microsoft.com/office/drawing/2014/main" id="{257EB455-D2B0-6371-18EA-3247101B071F}"/>
+                  </a:ext>
+                </a:extLst>
+              </p:cNvPr>
+              <p:cNvSpPr>
+                <a:spLocks noGrp="1"/>
+              </p:cNvSpPr>
+              <p:nvPr>
+                <p:ph sz="half" idx="1"/>
+              </p:nvPr>
+            </p:nvSpPr>
+            <p:spPr/>
+            <p:txBody>
+              <a:bodyPr tIns="432000"/>
+              <a:lstStyle/>
+              <a:p>
+                <a:pPr marL="0" marR="0" lvl="0" indent="0" algn="l" defTabSz="914400" rtl="0" eaLnBrk="1" fontAlgn="auto" latinLnBrk="0" hangingPunct="1">
+                  <a:lnSpc>
+                    <a:spcPct val="160000"/>
+                  </a:lnSpc>
+                  <a:spcBef>
+                    <a:spcPts val="1000"/>
+                  </a:spcBef>
+                  <a:spcAft>
+                    <a:spcPts val="0"/>
+                  </a:spcAft>
+                  <a:buClrTx/>
+                  <a:buSzTx/>
+                  <a:buNone/>
+                  <a:tabLst/>
+                  <a:defRPr/>
+                </a:pPr>
+                <a:r>
+                  <a:rPr kumimoji="0" lang="it-IT" sz="1700" b="1" i="0" u="none" strike="noStrike" kern="1200" cap="none" spc="0" normalizeH="0" baseline="0" noProof="0" dirty="0">
+                    <a:ln>
+                      <a:noFill/>
+                    </a:ln>
+                    <a:solidFill>
+                      <a:prstClr val="black"/>
+                    </a:solidFill>
+                    <a:effectLst/>
+                    <a:uLnTx/>
+                    <a:uFillTx/>
+                    <a:ea typeface="+mn-ea"/>
+                    <a:cs typeface="+mn-cs"/>
+                  </a:rPr>
+                  <a:t>Idea di partenza: </a:t>
+                </a:r>
+                <a:r>
+                  <a:rPr kumimoji="0" lang="it-IT" sz="1700" b="0" i="0" u="sng" strike="noStrike" kern="1200" cap="none" spc="0" normalizeH="0" baseline="0" noProof="0" dirty="0">
+                    <a:ln>
+                      <a:noFill/>
+                    </a:ln>
+                    <a:solidFill>
+                      <a:prstClr val="black"/>
+                    </a:solidFill>
+                    <a:effectLst/>
+                    <a:uLnTx/>
+                    <a:uFillTx/>
+                    <a:ea typeface="+mn-ea"/>
+                    <a:cs typeface="+mn-cs"/>
+                  </a:rPr>
+                  <a:t>sfruttare un impulso tangente</a:t>
+                </a:r>
+                <a:r>
+                  <a:rPr kumimoji="0" lang="it-IT" sz="1700" b="0" i="0" u="none" strike="noStrike" kern="1200" cap="none" spc="0" normalizeH="0" baseline="0" noProof="0" dirty="0">
+                    <a:ln>
+                      <a:noFill/>
+                    </a:ln>
+                    <a:solidFill>
+                      <a:prstClr val="black"/>
+                    </a:solidFill>
+                    <a:effectLst/>
+                    <a:uLnTx/>
+                    <a:uFillTx/>
+                    <a:ea typeface="+mn-ea"/>
+                    <a:cs typeface="+mn-cs"/>
+                  </a:rPr>
+                  <a:t> in un punto arbitrario sull’orbita iniziale per:</a:t>
+                </a:r>
+              </a:p>
+              <a:p>
+                <a:pPr marL="228600" marR="0" lvl="0" indent="-228600" algn="l" defTabSz="914400" rtl="0" eaLnBrk="1" fontAlgn="auto" latinLnBrk="0" hangingPunct="1">
+                  <a:lnSpc>
+                    <a:spcPct val="160000"/>
+                  </a:lnSpc>
+                  <a:spcBef>
+                    <a:spcPts val="1000"/>
+                  </a:spcBef>
+                  <a:spcAft>
+                    <a:spcPts val="0"/>
+                  </a:spcAft>
+                  <a:buClrTx/>
+                  <a:buSzTx/>
+                  <a:buFont typeface="Arial" panose="020B0604020202020204" pitchFamily="34" charset="0"/>
+                  <a:buChar char="•"/>
+                  <a:tabLst/>
+                  <a:defRPr/>
+                </a:pPr>
+                <a:r>
+                  <a:rPr kumimoji="0" lang="it-IT" sz="1700" b="0" i="0" u="sng" strike="noStrike" kern="1200" cap="none" spc="0" normalizeH="0" baseline="0" noProof="0" dirty="0">
+                    <a:ln>
+                      <a:noFill/>
+                    </a:ln>
+                    <a:solidFill>
+                      <a:prstClr val="black"/>
+                    </a:solidFill>
+                    <a:effectLst/>
+                    <a:uLnTx/>
+                    <a:uFillTx/>
+                    <a:ea typeface="+mn-ea"/>
+                    <a:cs typeface="+mn-cs"/>
+                  </a:rPr>
+                  <a:t>diminuire il costo del cambio di piano</a:t>
+                </a:r>
+                <a:r>
+                  <a:rPr kumimoji="0" lang="it-IT" sz="1700" b="0" i="0" u="none" strike="noStrike" kern="1200" cap="none" spc="0" normalizeH="0" baseline="0" noProof="0" dirty="0">
+                    <a:ln>
+                      <a:noFill/>
+                    </a:ln>
+                    <a:solidFill>
+                      <a:prstClr val="black"/>
+                    </a:solidFill>
+                    <a:effectLst/>
+                    <a:uLnTx/>
+                    <a:uFillTx/>
+                    <a:ea typeface="+mn-ea"/>
+                    <a:cs typeface="+mn-cs"/>
+                  </a:rPr>
+                  <a:t> attraverso un aumento di eccentricità e semiasse maggiore</a:t>
+                </a:r>
+              </a:p>
+              <a:p>
+                <a:pPr marL="228600" marR="0" lvl="0" indent="-228600" algn="l" defTabSz="914400" rtl="0" eaLnBrk="1" fontAlgn="auto" latinLnBrk="0" hangingPunct="1">
+                  <a:lnSpc>
+                    <a:spcPct val="160000"/>
+                  </a:lnSpc>
+                  <a:spcBef>
+                    <a:spcPts val="1000"/>
+                  </a:spcBef>
+                  <a:spcAft>
+                    <a:spcPts val="0"/>
+                  </a:spcAft>
+                  <a:buClrTx/>
+                  <a:buSzTx/>
+                  <a:buFont typeface="Arial" panose="020B0604020202020204" pitchFamily="34" charset="0"/>
+                  <a:buChar char="•"/>
+                  <a:tabLst/>
+                  <a:defRPr/>
+                </a:pPr>
+                <a:r>
+                  <a:rPr kumimoji="0" lang="it-IT" sz="1700" b="0" i="0" u="sng" strike="noStrike" kern="1200" cap="none" spc="0" normalizeH="0" baseline="0" noProof="0" dirty="0">
+                    <a:ln>
+                      <a:noFill/>
+                    </a:ln>
+                    <a:solidFill>
+                      <a:prstClr val="black"/>
+                    </a:solidFill>
+                    <a:effectLst/>
+                    <a:uLnTx/>
+                    <a:uFillTx/>
+                    <a:ea typeface="+mn-ea"/>
+                    <a:cs typeface="+mn-cs"/>
+                  </a:rPr>
+                  <a:t>correggere l’anomalia di pericentro</a:t>
+                </a:r>
+                <a:r>
+                  <a:rPr kumimoji="0" lang="it-IT" sz="1700" b="0" i="0" u="none" strike="noStrike" kern="1200" cap="none" spc="0" normalizeH="0" baseline="0" noProof="0" dirty="0">
+                    <a:ln>
+                      <a:noFill/>
+                    </a:ln>
+                    <a:solidFill>
+                      <a:prstClr val="black"/>
+                    </a:solidFill>
+                    <a:effectLst/>
+                    <a:uLnTx/>
+                    <a:uFillTx/>
+                    <a:ea typeface="+mn-ea"/>
+                    <a:cs typeface="+mn-cs"/>
+                  </a:rPr>
+                  <a:t> senza ricorrere ad una manovra dedicata o ad impulsi secanti</a:t>
+                </a:r>
+                <a:endParaRPr kumimoji="0" lang="it-IT" sz="1700" b="0" i="0" u="sng" strike="noStrike" kern="1200" cap="none" spc="0" normalizeH="0" baseline="0" noProof="0" dirty="0">
+                  <a:ln>
+                    <a:noFill/>
+                  </a:ln>
+                  <a:solidFill>
+                    <a:prstClr val="black"/>
+                  </a:solidFill>
+                  <a:effectLst/>
+                  <a:uLnTx/>
+                  <a:uFillTx/>
+                  <a:ea typeface="+mn-ea"/>
+                  <a:cs typeface="+mn-cs"/>
+                </a:endParaRPr>
+              </a:p>
+              <a:p>
+                <a:pPr marL="0" indent="0">
+                  <a:buNone/>
+                </a:pPr>
+                <a:endParaRPr lang="it-IT" sz="1700" dirty="0"/>
+              </a:p>
+              <a:p>
+                <a:pPr marL="0" indent="0">
+                  <a:buNone/>
+                </a:pPr>
+                <a14:m>
+                  <m:oMath xmlns:m="http://schemas.openxmlformats.org/officeDocument/2006/math">
+                    <m:r>
+                      <a:rPr lang="it-IT" sz="1700" b="1" i="0" smtClean="0"/>
+                      <m:t>𝚫</m:t>
+                    </m:r>
+                    <m:sSub>
+                      <m:sSubPr>
+                        <m:ctrlPr>
+                          <a:rPr lang="it-IT" sz="1700" b="1" i="1" smtClean="0"/>
+                        </m:ctrlPr>
+                      </m:sSubPr>
+                      <m:e>
+                        <m:r>
+                          <a:rPr lang="it-IT" sz="1700" b="1" i="1" smtClean="0"/>
+                          <m:t>𝒗</m:t>
+                        </m:r>
+                      </m:e>
+                      <m:sub>
+                        <m:r>
+                          <a:rPr lang="it-IT" sz="1700" b="1" i="1" smtClean="0"/>
+                          <m:t>𝒕𝒐𝒕</m:t>
+                        </m:r>
+                      </m:sub>
+                    </m:sSub>
+                  </m:oMath>
+                </a14:m>
+                <a:r>
+                  <a:rPr lang="it-IT" sz="1700" b="1" dirty="0"/>
+                  <a:t> = 5.3574 km/s</a:t>
+                </a:r>
+              </a:p>
+              <a:p>
+                <a:pPr marL="0" indent="0">
+                  <a:buNone/>
+                </a:pPr>
+                <a14:m>
+                  <m:oMath xmlns:m="http://schemas.openxmlformats.org/officeDocument/2006/math">
+                    <m:r>
+                      <a:rPr lang="it-IT" sz="1700" b="1" i="0" smtClean="0"/>
+                      <m:t>𝚫</m:t>
+                    </m:r>
+                    <m:sSub>
+                      <m:sSubPr>
+                        <m:ctrlPr>
+                          <a:rPr lang="it-IT" sz="1700" b="1" i="1" smtClean="0"/>
+                        </m:ctrlPr>
+                      </m:sSubPr>
+                      <m:e>
+                        <m:r>
+                          <a:rPr lang="it-IT" sz="1700" b="1" i="1" smtClean="0"/>
+                          <m:t>𝒕</m:t>
+                        </m:r>
+                      </m:e>
+                      <m:sub>
+                        <m:r>
+                          <a:rPr lang="it-IT" sz="1700" b="1" i="1" smtClean="0"/>
+                          <m:t>𝒕𝒐𝒕</m:t>
+                        </m:r>
+                      </m:sub>
+                    </m:sSub>
+                  </m:oMath>
+                </a14:m>
+                <a:r>
+                  <a:rPr lang="it-IT" sz="1700" b="1" dirty="0"/>
+                  <a:t> = 7.8499 h = 28259.7957 s</a:t>
+                </a:r>
+              </a:p>
+            </p:txBody>
+          </p:sp>
+        </mc:Choice>
+        <mc:Fallback>
+          <p:sp>
+            <p:nvSpPr>
+              <p:cNvPr id="6" name="Segnaposto contenuto 5">
+                <a:extLst>
+                  <a:ext uri="{FF2B5EF4-FFF2-40B4-BE49-F238E27FC236}">
+                    <a16:creationId xmlns:a16="http://schemas.microsoft.com/office/drawing/2014/main" id="{257EB455-D2B0-6371-18EA-3247101B071F}"/>
+                  </a:ext>
+                </a:extLst>
+              </p:cNvPr>
+              <p:cNvSpPr>
+                <a:spLocks noGrp="1" noRot="1" noChangeAspect="1" noMove="1" noResize="1" noEditPoints="1" noAdjustHandles="1" noChangeArrowheads="1" noChangeShapeType="1" noTextEdit="1"/>
+              </p:cNvSpPr>
+              <p:nvPr>
+                <p:ph sz="half" idx="1"/>
+              </p:nvPr>
+            </p:nvSpPr>
+            <p:spPr>
+              <a:blipFill>
+                <a:blip r:embed="rId2"/>
+                <a:stretch>
+                  <a:fillRect l="-824" r="-118"/>
+                </a:stretch>
+              </a:blipFill>
+            </p:spPr>
+            <p:txBody>
+              <a:bodyPr/>
+              <a:lstStyle/>
+              <a:p>
+                <a:r>
+                  <a:rPr lang="it-IT">
+                    <a:noFill/>
+                  </a:rPr>
+                  <a:t> </a:t>
+                </a:r>
+              </a:p>
+            </p:txBody>
+          </p:sp>
+        </mc:Fallback>
+      </mc:AlternateContent>
+      <p:pic>
+        <p:nvPicPr>
+          <p:cNvPr id="8" name="Segnaposto contenuto 7">
             <a:extLst>
               <a:ext uri="{FF2B5EF4-FFF2-40B4-BE49-F238E27FC236}">
-                <a16:creationId xmlns:a16="http://schemas.microsoft.com/office/drawing/2014/main" id="{257EB455-D2B0-6371-18EA-3247101B071F}"/>
+                <a16:creationId xmlns:a16="http://schemas.microsoft.com/office/drawing/2014/main" id="{3B99BFD4-77D9-4A91-1D0D-BFE8AE8CE27A}"/>
               </a:ext>
             </a:extLst>
           </p:cNvPr>
-          <p:cNvSpPr>
-            <a:spLocks noGrp="1"/>
-          </p:cNvSpPr>
-          <p:nvPr>
-            <p:ph sz="half" idx="1"/>
-          </p:nvPr>
-        </p:nvSpPr>
-        <p:spPr/>
-        <p:txBody>
-          <a:bodyPr/>
-          <a:lstStyle/>
-          <a:p>
-            <a:endParaRPr lang="it-IT"/>
-          </a:p>
-        </p:txBody>
-      </p:sp>
-      <p:sp>
-        <p:nvSpPr>
-          <p:cNvPr id="7" name="Segnaposto contenuto 6">
+          <p:cNvPicPr>
+            <a:picLocks noGrp="1" noChangeAspect="1"/>
+          </p:cNvPicPr>
+          <p:nvPr>
+            <p:ph sz="half" idx="2"/>
+          </p:nvPr>
+        </p:nvPicPr>
+        <p:blipFill>
+          <a:blip r:embed="rId3">
             <a:extLst>
-              <a:ext uri="{FF2B5EF4-FFF2-40B4-BE49-F238E27FC236}">
-                <a16:creationId xmlns:a16="http://schemas.microsoft.com/office/drawing/2014/main" id="{949E024F-BF3F-C46F-C700-F4D5E93FB0AE}"/>
+              <a:ext uri="{28A0092B-C50C-407E-A947-70E740481C1C}">
+                <a14:useLocalDpi xmlns:a14="http://schemas.microsoft.com/office/drawing/2010/main" val="0"/>
               </a:ext>
             </a:extLst>
-          </p:cNvPr>
-          <p:cNvSpPr>
-            <a:spLocks noGrp="1"/>
-          </p:cNvSpPr>
-          <p:nvPr>
-            <p:ph sz="half" idx="2"/>
-          </p:nvPr>
-        </p:nvSpPr>
-        <p:spPr/>
-        <p:txBody>
-          <a:bodyPr/>
-          <a:lstStyle/>
-          <a:p>
-            <a:endParaRPr lang="it-IT"/>
-          </a:p>
-        </p:txBody>
-      </p:sp>
+          </a:blip>
+          <a:srcRect/>
+          <a:stretch/>
+        </p:blipFill>
+        <p:spPr>
+          <a:xfrm>
+            <a:off x="6019801" y="1083379"/>
+            <a:ext cx="5637241" cy="5195922"/>
+          </a:xfrm>
+        </p:spPr>
+      </p:pic>
       <p:sp>
         <p:nvSpPr>
           <p:cNvPr id="4" name="Segnaposto piè di pagina 3">
@@ -5086,6 +5416,1852 @@
           <p:cNvPr id="2" name="Titolo 1">
             <a:extLst>
               <a:ext uri="{FF2B5EF4-FFF2-40B4-BE49-F238E27FC236}">
+                <a16:creationId xmlns:a16="http://schemas.microsoft.com/office/drawing/2014/main" id="{90BD21C0-C947-D6DC-C260-055534CCE56C}"/>
+              </a:ext>
+            </a:extLst>
+          </p:cNvPr>
+          <p:cNvSpPr>
+            <a:spLocks noGrp="1"/>
+          </p:cNvSpPr>
+          <p:nvPr>
+            <p:ph type="title"/>
+          </p:nvPr>
+        </p:nvSpPr>
+        <p:spPr>
+          <a:xfrm>
+            <a:off x="838200" y="415400"/>
+            <a:ext cx="9467656" cy="590931"/>
+          </a:xfrm>
+        </p:spPr>
+        <p:txBody>
+          <a:bodyPr/>
+          <a:lstStyle/>
+          <a:p>
+            <a:r>
+              <a:rPr lang="it-IT" dirty="0"/>
+              <a:t>Alternativa 3: manovra tangente in punto arbitrario</a:t>
+            </a:r>
+          </a:p>
+        </p:txBody>
+      </p:sp>
+      <mc:AlternateContent xmlns:mc="http://schemas.openxmlformats.org/markup-compatibility/2006">
+        <mc:Choice xmlns:a14="http://schemas.microsoft.com/office/drawing/2010/main" Requires="a14">
+          <p:sp>
+            <p:nvSpPr>
+              <p:cNvPr id="3" name="Segnaposto contenuto 2">
+                <a:extLst>
+                  <a:ext uri="{FF2B5EF4-FFF2-40B4-BE49-F238E27FC236}">
+                    <a16:creationId xmlns:a16="http://schemas.microsoft.com/office/drawing/2014/main" id="{5AC40F27-E092-431D-E43F-1018357E31FA}"/>
+                  </a:ext>
+                </a:extLst>
+              </p:cNvPr>
+              <p:cNvSpPr>
+                <a:spLocks noGrp="1"/>
+              </p:cNvSpPr>
+              <p:nvPr>
+                <p:ph sz="half" idx="1"/>
+              </p:nvPr>
+            </p:nvSpPr>
+            <p:spPr/>
+            <p:txBody>
+              <a:bodyPr tIns="180000"/>
+              <a:lstStyle/>
+              <a:p>
+                <a:pPr>
+                  <a:lnSpc>
+                    <a:spcPct val="120000"/>
+                  </a:lnSpc>
+                </a:pPr>
+                <a:r>
+                  <a:rPr lang="it-IT" sz="1800" b="1" dirty="0"/>
+                  <a:t>Parametri orbitali variati:</a:t>
+                </a:r>
+                <a:r>
+                  <a:rPr lang="it-IT" sz="1800" dirty="0"/>
+                  <a:t> </a:t>
+                </a:r>
+                <a14:m>
+                  <m:oMath xmlns:m="http://schemas.openxmlformats.org/officeDocument/2006/math">
+                    <m:r>
+                      <a:rPr lang="it-IT" sz="1800" b="0" i="1" smtClean="0">
+                        <a:latin typeface="Cambria Math" panose="02040503050406030204" pitchFamily="18" charset="0"/>
+                      </a:rPr>
+                      <m:t>𝑎</m:t>
+                    </m:r>
+                    <m:r>
+                      <a:rPr lang="it-IT" sz="1800" b="0" i="1" smtClean="0">
+                        <a:latin typeface="Cambria Math" panose="02040503050406030204" pitchFamily="18" charset="0"/>
+                      </a:rPr>
+                      <m:t>, </m:t>
+                    </m:r>
+                    <m:r>
+                      <a:rPr lang="it-IT" sz="1800" b="0" i="1" smtClean="0">
+                        <a:latin typeface="Cambria Math" panose="02040503050406030204" pitchFamily="18" charset="0"/>
+                      </a:rPr>
+                      <m:t>𝑒</m:t>
+                    </m:r>
+                    <m:r>
+                      <a:rPr lang="it-IT" sz="1800" b="0" i="1" smtClean="0">
+                        <a:latin typeface="Cambria Math" panose="02040503050406030204" pitchFamily="18" charset="0"/>
+                      </a:rPr>
+                      <m:t>, </m:t>
+                    </m:r>
+                    <m:r>
+                      <a:rPr lang="it-IT" sz="1800" b="0" i="1" smtClean="0">
+                        <a:latin typeface="Cambria Math" panose="02040503050406030204" pitchFamily="18" charset="0"/>
+                      </a:rPr>
+                      <m:t>𝜔</m:t>
+                    </m:r>
+                  </m:oMath>
+                </a14:m>
+                <a:endParaRPr lang="it-IT" sz="1800" dirty="0"/>
+              </a:p>
+              <a:p>
+                <a:pPr>
+                  <a:lnSpc>
+                    <a:spcPct val="120000"/>
+                  </a:lnSpc>
+                </a:pPr>
+                <a:r>
+                  <a:rPr lang="it-IT" sz="1800" b="1" dirty="0"/>
+                  <a:t>Passaggi effettuati:</a:t>
+                </a:r>
+              </a:p>
+              <a:p>
+                <a:pPr lvl="1">
+                  <a:lnSpc>
+                    <a:spcPct val="120000"/>
+                  </a:lnSpc>
+                </a:pPr>
+                <a:r>
+                  <a:rPr lang="it-IT" sz="1600" dirty="0"/>
+                  <a:t>Raggiungere punto di tangenza: </a:t>
+                </a:r>
+                <a14:m>
+                  <m:oMath xmlns:m="http://schemas.openxmlformats.org/officeDocument/2006/math">
+                    <m:r>
+                      <a:rPr lang="it-IT" sz="1600" b="1" i="0" smtClean="0">
+                        <a:latin typeface="Cambria Math" panose="02040503050406030204" pitchFamily="18" charset="0"/>
+                      </a:rPr>
+                      <m:t>𝚫</m:t>
+                    </m:r>
+                    <m:sSub>
+                      <m:sSubPr>
+                        <m:ctrlPr>
+                          <a:rPr lang="it-IT" sz="1600" b="1" i="1" smtClean="0">
+                            <a:latin typeface="Cambria Math" panose="02040503050406030204" pitchFamily="18" charset="0"/>
+                          </a:rPr>
+                        </m:ctrlPr>
+                      </m:sSubPr>
+                      <m:e>
+                        <m:r>
+                          <a:rPr lang="it-IT" sz="1600" b="1" i="1" smtClean="0">
+                            <a:latin typeface="Cambria Math" panose="02040503050406030204" pitchFamily="18" charset="0"/>
+                          </a:rPr>
+                          <m:t>𝒕</m:t>
+                        </m:r>
+                      </m:e>
+                      <m:sub>
+                        <m:r>
+                          <a:rPr lang="it-IT" sz="1600" b="1" i="1" smtClean="0">
+                            <a:latin typeface="Cambria Math" panose="02040503050406030204" pitchFamily="18" charset="0"/>
+                          </a:rPr>
+                          <m:t>𝟏</m:t>
+                        </m:r>
+                      </m:sub>
+                    </m:sSub>
+                  </m:oMath>
+                </a14:m>
+                <a:r>
+                  <a:rPr lang="it-IT" sz="1600" b="1" dirty="0"/>
+                  <a:t> = 6543 s</a:t>
+                </a:r>
+              </a:p>
+              <a:p>
+                <a:pPr lvl="1">
+                  <a:lnSpc>
+                    <a:spcPct val="120000"/>
+                  </a:lnSpc>
+                </a:pPr>
+                <a:r>
+                  <a:rPr lang="it-IT" sz="1600" dirty="0"/>
+                  <a:t>Primo impulso: </a:t>
+                </a:r>
+                <a14:m>
+                  <m:oMath xmlns:m="http://schemas.openxmlformats.org/officeDocument/2006/math">
+                    <m:r>
+                      <a:rPr lang="it-IT" sz="1600" b="1" i="0" smtClean="0">
+                        <a:latin typeface="Cambria Math" panose="02040503050406030204" pitchFamily="18" charset="0"/>
+                      </a:rPr>
+                      <m:t>𝚫</m:t>
+                    </m:r>
+                    <m:sSub>
+                      <m:sSubPr>
+                        <m:ctrlPr>
+                          <a:rPr lang="it-IT" sz="1600" b="1" i="1" smtClean="0">
+                            <a:latin typeface="Cambria Math" panose="02040503050406030204" pitchFamily="18" charset="0"/>
+                          </a:rPr>
+                        </m:ctrlPr>
+                      </m:sSubPr>
+                      <m:e>
+                        <m:r>
+                          <a:rPr lang="it-IT" sz="1600" b="1" i="1" smtClean="0">
+                            <a:latin typeface="Cambria Math" panose="02040503050406030204" pitchFamily="18" charset="0"/>
+                          </a:rPr>
+                          <m:t>𝒗</m:t>
+                        </m:r>
+                      </m:e>
+                      <m:sub>
+                        <m:r>
+                          <a:rPr lang="it-IT" sz="1600" b="1" i="1" smtClean="0">
+                            <a:latin typeface="Cambria Math" panose="02040503050406030204" pitchFamily="18" charset="0"/>
+                          </a:rPr>
+                          <m:t>𝟏</m:t>
+                        </m:r>
+                      </m:sub>
+                    </m:sSub>
+                  </m:oMath>
+                </a14:m>
+                <a:r>
+                  <a:rPr lang="it-IT" sz="1600" b="1" dirty="0"/>
+                  <a:t> = 0.6212 km/s</a:t>
+                </a:r>
+              </a:p>
+              <a:p>
+                <a:pPr lvl="1">
+                  <a:lnSpc>
+                    <a:spcPct val="120000"/>
+                  </a:lnSpc>
+                </a:pPr>
+                <a:r>
+                  <a:rPr lang="it-IT" sz="1600" dirty="0"/>
+                  <a:t>Percorrenza su orbita tangente: </a:t>
+                </a:r>
+                <a14:m>
+                  <m:oMath xmlns:m="http://schemas.openxmlformats.org/officeDocument/2006/math">
+                    <m:r>
+                      <a:rPr lang="it-IT" sz="1600" b="1" i="0" smtClean="0">
+                        <a:latin typeface="Cambria Math" panose="02040503050406030204" pitchFamily="18" charset="0"/>
+                      </a:rPr>
+                      <m:t>𝚫</m:t>
+                    </m:r>
+                    <m:sSub>
+                      <m:sSubPr>
+                        <m:ctrlPr>
+                          <a:rPr lang="it-IT" sz="1600" b="1" i="1" smtClean="0">
+                            <a:latin typeface="Cambria Math" panose="02040503050406030204" pitchFamily="18" charset="0"/>
+                          </a:rPr>
+                        </m:ctrlPr>
+                      </m:sSubPr>
+                      <m:e>
+                        <m:r>
+                          <a:rPr lang="it-IT" sz="1600" b="1" i="1" smtClean="0">
+                            <a:latin typeface="Cambria Math" panose="02040503050406030204" pitchFamily="18" charset="0"/>
+                          </a:rPr>
+                          <m:t>𝒕</m:t>
+                        </m:r>
+                      </m:e>
+                      <m:sub>
+                        <m:r>
+                          <a:rPr lang="it-IT" sz="1600" b="1" i="1" smtClean="0">
+                            <a:latin typeface="Cambria Math" panose="02040503050406030204" pitchFamily="18" charset="0"/>
+                          </a:rPr>
+                          <m:t>𝟐</m:t>
+                        </m:r>
+                      </m:sub>
+                    </m:sSub>
+                  </m:oMath>
+                </a14:m>
+                <a:r>
+                  <a:rPr lang="it-IT" sz="1600" b="1" dirty="0"/>
+                  <a:t> = 7118 s</a:t>
+                </a:r>
+              </a:p>
+              <a:p>
+                <a:pPr>
+                  <a:lnSpc>
+                    <a:spcPct val="120000"/>
+                  </a:lnSpc>
+                </a:pPr>
+                <a:r>
+                  <a:rPr lang="it-IT" sz="1800" b="1" dirty="0"/>
+                  <a:t>Punti critici:</a:t>
+                </a:r>
+              </a:p>
+              <a:p>
+                <a:pPr lvl="1">
+                  <a:lnSpc>
+                    <a:spcPct val="120000"/>
+                  </a:lnSpc>
+                </a:pPr>
+                <a:r>
+                  <a:rPr lang="it-IT" sz="1600" dirty="0"/>
+                  <a:t>Questa manovra è stata definita attraverso l’</a:t>
+                </a:r>
+                <a:r>
+                  <a:rPr lang="it-IT" sz="1600" u="sng" dirty="0"/>
+                  <a:t>imposizione del </a:t>
+                </a:r>
+                <a14:m>
+                  <m:oMath xmlns:m="http://schemas.openxmlformats.org/officeDocument/2006/math">
+                    <m:r>
+                      <a:rPr lang="it-IT" sz="1600" b="0" i="1" u="sng" smtClean="0">
+                        <a:latin typeface="Cambria Math" panose="02040503050406030204" pitchFamily="18" charset="0"/>
+                      </a:rPr>
+                      <m:t>𝜔</m:t>
+                    </m:r>
+                  </m:oMath>
+                </a14:m>
+                <a:r>
+                  <a:rPr lang="it-IT" sz="1600" dirty="0"/>
+                  <a:t> dell’orbita tangente in grado di assicurare l’allineamento con l’orbita finale a seguito del cambio di piano</a:t>
+                </a:r>
+              </a:p>
+              <a:p>
+                <a:pPr lvl="1">
+                  <a:lnSpc>
+                    <a:spcPct val="120000"/>
+                  </a:lnSpc>
+                </a:pPr>
+                <a:r>
+                  <a:rPr lang="it-IT" sz="1600" dirty="0"/>
+                  <a:t>Le orbite tangenti che soddisfano tale richiesta sono infinite: è stato scelto di </a:t>
+                </a:r>
+                <a:r>
+                  <a:rPr lang="it-IT" sz="1600" u="sng" dirty="0"/>
+                  <a:t>imporre il </a:t>
+                </a:r>
+                <a14:m>
+                  <m:oMath xmlns:m="http://schemas.openxmlformats.org/officeDocument/2006/math">
+                    <m:r>
+                      <m:rPr>
+                        <m:sty m:val="p"/>
+                      </m:rPr>
+                      <a:rPr lang="it-IT" sz="1600" b="0" i="0" u="sng" smtClean="0">
+                        <a:latin typeface="Cambria Math" panose="02040503050406030204" pitchFamily="18" charset="0"/>
+                      </a:rPr>
+                      <m:t>Δ</m:t>
+                    </m:r>
+                    <m:sSub>
+                      <m:sSubPr>
+                        <m:ctrlPr>
+                          <a:rPr lang="it-IT" sz="1600" b="0" i="1" u="sng" smtClean="0">
+                            <a:latin typeface="Cambria Math" panose="02040503050406030204" pitchFamily="18" charset="0"/>
+                          </a:rPr>
+                        </m:ctrlPr>
+                      </m:sSubPr>
+                      <m:e>
+                        <m:r>
+                          <a:rPr lang="it-IT" sz="1600" b="0" i="1" u="sng" smtClean="0">
+                            <a:latin typeface="Cambria Math" panose="02040503050406030204" pitchFamily="18" charset="0"/>
+                          </a:rPr>
+                          <m:t>𝑣</m:t>
+                        </m:r>
+                      </m:e>
+                      <m:sub>
+                        <m:r>
+                          <a:rPr lang="it-IT" sz="1600" b="0" i="1" u="sng" smtClean="0">
+                            <a:latin typeface="Cambria Math" panose="02040503050406030204" pitchFamily="18" charset="0"/>
+                          </a:rPr>
+                          <m:t>1</m:t>
+                        </m:r>
+                      </m:sub>
+                    </m:sSub>
+                  </m:oMath>
+                </a14:m>
+                <a:r>
+                  <a:rPr lang="it-IT" sz="1600" dirty="0"/>
+                  <a:t> che minimizzasse il costo complessivo della strategia</a:t>
+                </a:r>
+              </a:p>
+            </p:txBody>
+          </p:sp>
+        </mc:Choice>
+        <mc:Fallback>
+          <p:sp>
+            <p:nvSpPr>
+              <p:cNvPr id="3" name="Segnaposto contenuto 2">
+                <a:extLst>
+                  <a:ext uri="{FF2B5EF4-FFF2-40B4-BE49-F238E27FC236}">
+                    <a16:creationId xmlns:a16="http://schemas.microsoft.com/office/drawing/2014/main" id="{5AC40F27-E092-431D-E43F-1018357E31FA}"/>
+                  </a:ext>
+                </a:extLst>
+              </p:cNvPr>
+              <p:cNvSpPr>
+                <a:spLocks noGrp="1" noRot="1" noChangeAspect="1" noMove="1" noResize="1" noEditPoints="1" noAdjustHandles="1" noChangeArrowheads="1" noChangeShapeType="1" noTextEdit="1"/>
+              </p:cNvSpPr>
+              <p:nvPr>
+                <p:ph sz="half" idx="1"/>
+              </p:nvPr>
+            </p:nvSpPr>
+            <p:spPr>
+              <a:blipFill>
+                <a:blip r:embed="rId2"/>
+                <a:stretch>
+                  <a:fillRect l="-824" r="-1294"/>
+                </a:stretch>
+              </a:blipFill>
+            </p:spPr>
+            <p:txBody>
+              <a:bodyPr/>
+              <a:lstStyle/>
+              <a:p>
+                <a:r>
+                  <a:rPr lang="it-IT">
+                    <a:noFill/>
+                  </a:rPr>
+                  <a:t> </a:t>
+                </a:r>
+              </a:p>
+            </p:txBody>
+          </p:sp>
+        </mc:Fallback>
+      </mc:AlternateContent>
+      <p:sp>
+        <p:nvSpPr>
+          <p:cNvPr id="5" name="Segnaposto piè di pagina 4">
+            <a:extLst>
+              <a:ext uri="{FF2B5EF4-FFF2-40B4-BE49-F238E27FC236}">
+                <a16:creationId xmlns:a16="http://schemas.microsoft.com/office/drawing/2014/main" id="{EFB33E3E-F64B-56F3-A3A9-F5F588CD63C3}"/>
+              </a:ext>
+            </a:extLst>
+          </p:cNvPr>
+          <p:cNvSpPr>
+            <a:spLocks noGrp="1"/>
+          </p:cNvSpPr>
+          <p:nvPr>
+            <p:ph type="ftr" sz="quarter" idx="11"/>
+          </p:nvPr>
+        </p:nvSpPr>
+        <p:spPr/>
+        <p:txBody>
+          <a:bodyPr/>
+          <a:lstStyle/>
+          <a:p>
+            <a:r>
+              <a:rPr lang="it-IT"/>
+              <a:t>Prova finale: Introduzione all’Analisi di Missioni Spaziali</a:t>
+            </a:r>
+          </a:p>
+        </p:txBody>
+      </p:sp>
+      <p:sp>
+        <p:nvSpPr>
+          <p:cNvPr id="6" name="Segnaposto numero diapositiva 5">
+            <a:extLst>
+              <a:ext uri="{FF2B5EF4-FFF2-40B4-BE49-F238E27FC236}">
+                <a16:creationId xmlns:a16="http://schemas.microsoft.com/office/drawing/2014/main" id="{3AC3E4A4-F08E-994D-3733-032BFA0DF662}"/>
+              </a:ext>
+            </a:extLst>
+          </p:cNvPr>
+          <p:cNvSpPr>
+            <a:spLocks noGrp="1"/>
+          </p:cNvSpPr>
+          <p:nvPr>
+            <p:ph type="sldNum" sz="quarter" idx="12"/>
+          </p:nvPr>
+        </p:nvSpPr>
+        <p:spPr/>
+        <p:txBody>
+          <a:bodyPr/>
+          <a:lstStyle/>
+          <a:p>
+            <a:fld id="{07ED6331-BE36-4EB0-BAD8-FC72B96BFAEC}" type="slidenum">
+              <a:rPr lang="it-IT" smtClean="0"/>
+              <a:pPr/>
+              <a:t>14</a:t>
+            </a:fld>
+            <a:endParaRPr lang="it-IT"/>
+          </a:p>
+        </p:txBody>
+      </p:sp>
+      <p:pic>
+        <p:nvPicPr>
+          <p:cNvPr id="12" name="Segnaposto contenuto 11">
+            <a:extLst>
+              <a:ext uri="{FF2B5EF4-FFF2-40B4-BE49-F238E27FC236}">
+                <a16:creationId xmlns:a16="http://schemas.microsoft.com/office/drawing/2014/main" id="{536FB45F-0E63-C946-0075-656B9C1147FD}"/>
+              </a:ext>
+            </a:extLst>
+          </p:cNvPr>
+          <p:cNvPicPr>
+            <a:picLocks noGrp="1" noChangeAspect="1"/>
+          </p:cNvPicPr>
+          <p:nvPr>
+            <p:ph sz="half" idx="2"/>
+          </p:nvPr>
+        </p:nvPicPr>
+        <p:blipFill>
+          <a:blip r:embed="rId3">
+            <a:extLst>
+              <a:ext uri="{28A0092B-C50C-407E-A947-70E740481C1C}">
+                <a14:useLocalDpi xmlns:a14="http://schemas.microsoft.com/office/drawing/2010/main" val="0"/>
+              </a:ext>
+            </a:extLst>
+          </a:blip>
+          <a:srcRect/>
+          <a:stretch/>
+        </p:blipFill>
+        <p:spPr>
+          <a:xfrm>
+            <a:off x="6019800" y="1063464"/>
+            <a:ext cx="5598458" cy="5235753"/>
+          </a:xfrm>
+        </p:spPr>
+      </p:pic>
+    </p:spTree>
+    <p:extLst>
+      <p:ext uri="{BB962C8B-B14F-4D97-AF65-F5344CB8AC3E}">
+        <p14:creationId xmlns:p14="http://schemas.microsoft.com/office/powerpoint/2010/main" val="1950730613"/>
+      </p:ext>
+    </p:extLst>
+  </p:cSld>
+  <p:clrMapOvr>
+    <a:masterClrMapping/>
+  </p:clrMapOvr>
+</p:sld>
+</file>
+
+<file path=ppt/slides/slide15.xml><?xml version="1.0" encoding="utf-8"?>
+<p:sld xmlns:a="http://schemas.openxmlformats.org/drawingml/2006/main" xmlns:r="http://schemas.openxmlformats.org/officeDocument/2006/relationships" xmlns:p="http://schemas.openxmlformats.org/presentationml/2006/main">
+  <p:cSld>
+    <p:spTree>
+      <p:nvGrpSpPr>
+        <p:cNvPr id="1" name=""/>
+        <p:cNvGrpSpPr/>
+        <p:nvPr/>
+      </p:nvGrpSpPr>
+      <p:grpSpPr>
+        <a:xfrm>
+          <a:off x="0" y="0"/>
+          <a:ext cx="0" cy="0"/>
+          <a:chOff x="0" y="0"/>
+          <a:chExt cx="0" cy="0"/>
+        </a:xfrm>
+      </p:grpSpPr>
+      <p:sp>
+        <p:nvSpPr>
+          <p:cNvPr id="2" name="Titolo 1">
+            <a:extLst>
+              <a:ext uri="{FF2B5EF4-FFF2-40B4-BE49-F238E27FC236}">
+                <a16:creationId xmlns:a16="http://schemas.microsoft.com/office/drawing/2014/main" id="{E2041012-DED4-B3B0-BBE3-1AE1F1BFE2CD}"/>
+              </a:ext>
+            </a:extLst>
+          </p:cNvPr>
+          <p:cNvSpPr>
+            <a:spLocks noGrp="1"/>
+          </p:cNvSpPr>
+          <p:nvPr>
+            <p:ph type="title"/>
+          </p:nvPr>
+        </p:nvSpPr>
+        <p:spPr>
+          <a:xfrm>
+            <a:off x="838200" y="415400"/>
+            <a:ext cx="9467656" cy="590931"/>
+          </a:xfrm>
+        </p:spPr>
+        <p:txBody>
+          <a:bodyPr/>
+          <a:lstStyle/>
+          <a:p>
+            <a:r>
+              <a:rPr lang="it-IT" dirty="0"/>
+              <a:t>Alternativa 3: manovra tangente in punto arbitrario</a:t>
+            </a:r>
+          </a:p>
+        </p:txBody>
+      </p:sp>
+      <mc:AlternateContent xmlns:mc="http://schemas.openxmlformats.org/markup-compatibility/2006">
+        <mc:Choice xmlns:a14="http://schemas.microsoft.com/office/drawing/2010/main" Requires="a14">
+          <p:sp>
+            <p:nvSpPr>
+              <p:cNvPr id="3" name="Segnaposto contenuto 2">
+                <a:extLst>
+                  <a:ext uri="{FF2B5EF4-FFF2-40B4-BE49-F238E27FC236}">
+                    <a16:creationId xmlns:a16="http://schemas.microsoft.com/office/drawing/2014/main" id="{4D3F9DF7-77A1-FC09-60FA-59C05C4E0D54}"/>
+                  </a:ext>
+                </a:extLst>
+              </p:cNvPr>
+              <p:cNvSpPr>
+                <a:spLocks noGrp="1"/>
+              </p:cNvSpPr>
+              <p:nvPr>
+                <p:ph sz="half" idx="1"/>
+              </p:nvPr>
+            </p:nvSpPr>
+            <p:spPr/>
+            <p:txBody>
+              <a:bodyPr tIns="360000"/>
+              <a:lstStyle/>
+              <a:p>
+                <a:pPr>
+                  <a:lnSpc>
+                    <a:spcPct val="120000"/>
+                  </a:lnSpc>
+                </a:pPr>
+                <a:r>
+                  <a:rPr lang="it-IT" b="1" dirty="0"/>
+                  <a:t>Come si trova il parametro </a:t>
+                </a:r>
+                <a14:m>
+                  <m:oMath xmlns:m="http://schemas.openxmlformats.org/officeDocument/2006/math">
+                    <m:r>
+                      <a:rPr lang="it-IT" b="1" i="1" smtClean="0">
+                        <a:latin typeface="Cambria Math" panose="02040503050406030204" pitchFamily="18" charset="0"/>
+                      </a:rPr>
+                      <m:t>𝝎</m:t>
+                    </m:r>
+                  </m:oMath>
+                </a14:m>
+                <a:r>
+                  <a:rPr lang="it-IT" b="1" dirty="0"/>
+                  <a:t> da imporre nella manovra?</a:t>
+                </a:r>
+              </a:p>
+              <a:p>
+                <a:pPr marL="457200" lvl="1" indent="0">
+                  <a:lnSpc>
+                    <a:spcPct val="120000"/>
+                  </a:lnSpc>
+                  <a:buNone/>
+                </a:pPr>
+                <a:r>
+                  <a:rPr lang="it-IT" sz="1600" dirty="0"/>
+                  <a:t>Avendo nota l’orbita finale e l’inclinazione del piano orbitale iniziale, è possibile sfruttare le </a:t>
+                </a:r>
+                <a:r>
+                  <a:rPr lang="it-IT" sz="1600" u="sng" dirty="0"/>
+                  <a:t>formule per il cambio di piano</a:t>
+                </a:r>
+                <a:r>
+                  <a:rPr lang="it-IT" sz="1600" dirty="0"/>
+                  <a:t> per ottenere la </a:t>
+                </a:r>
+                <a14:m>
+                  <m:oMath xmlns:m="http://schemas.openxmlformats.org/officeDocument/2006/math">
+                    <m:r>
+                      <a:rPr lang="it-IT" sz="1600" b="0" i="1" smtClean="0">
+                        <a:latin typeface="Cambria Math" panose="02040503050406030204" pitchFamily="18" charset="0"/>
+                      </a:rPr>
+                      <m:t>𝜔</m:t>
+                    </m:r>
+                  </m:oMath>
+                </a14:m>
+                <a:r>
+                  <a:rPr lang="it-IT" sz="1600" dirty="0"/>
+                  <a:t> necessaria sul piano iniziale e i punti di cambio piano disponibili.</a:t>
+                </a:r>
+              </a:p>
+              <a:p>
+                <a:pPr>
+                  <a:lnSpc>
+                    <a:spcPct val="120000"/>
+                  </a:lnSpc>
+                </a:pPr>
+                <a:r>
+                  <a:rPr lang="it-IT" b="1" dirty="0"/>
+                  <a:t>Come e perché è stato scelto l’impulso iniziale?</a:t>
+                </a:r>
+              </a:p>
+              <a:p>
+                <a:pPr marL="457200" lvl="1" indent="0">
+                  <a:lnSpc>
+                    <a:spcPct val="120000"/>
+                  </a:lnSpc>
+                  <a:buNone/>
+                </a:pPr>
+                <a:r>
+                  <a:rPr lang="it-IT" sz="1600" dirty="0"/>
+                  <a:t>Il </a:t>
+                </a:r>
+                <a:r>
+                  <a:rPr lang="it-IT" sz="1600" u="sng" dirty="0"/>
+                  <a:t>problema</a:t>
+                </a:r>
+                <a:r>
+                  <a:rPr lang="it-IT" sz="1600" dirty="0"/>
+                  <a:t> finora descritto risulta </a:t>
+                </a:r>
+                <a:r>
+                  <a:rPr lang="it-IT" sz="1600" u="sng" dirty="0"/>
+                  <a:t>sotto determinato</a:t>
+                </a:r>
+                <a:r>
+                  <a:rPr lang="it-IT" sz="1600" dirty="0"/>
+                  <a:t>, pertanto le orbite tangenti possibili sono infinite. Anziché imporre classicamente il punto di manovra (o altre condizioni), è stato scelto di studiare </a:t>
+                </a:r>
+                <a:r>
+                  <a:rPr lang="it-IT" sz="1600" u="sng" dirty="0"/>
+                  <a:t>graficamente</a:t>
+                </a:r>
+                <a:r>
+                  <a:rPr lang="it-IT" sz="1600" dirty="0"/>
+                  <a:t> il costo complessivo della strategia in funzione dell’impulso iniziale e di scegliere il punto di costo minimo.</a:t>
+                </a:r>
+              </a:p>
+            </p:txBody>
+          </p:sp>
+        </mc:Choice>
+        <mc:Fallback>
+          <p:sp>
+            <p:nvSpPr>
+              <p:cNvPr id="3" name="Segnaposto contenuto 2">
+                <a:extLst>
+                  <a:ext uri="{FF2B5EF4-FFF2-40B4-BE49-F238E27FC236}">
+                    <a16:creationId xmlns:a16="http://schemas.microsoft.com/office/drawing/2014/main" id="{4D3F9DF7-77A1-FC09-60FA-59C05C4E0D54}"/>
+                  </a:ext>
+                </a:extLst>
+              </p:cNvPr>
+              <p:cNvSpPr>
+                <a:spLocks noGrp="1" noRot="1" noChangeAspect="1" noMove="1" noResize="1" noEditPoints="1" noAdjustHandles="1" noChangeArrowheads="1" noChangeShapeType="1" noTextEdit="1"/>
+              </p:cNvSpPr>
+              <p:nvPr>
+                <p:ph sz="half" idx="1"/>
+              </p:nvPr>
+            </p:nvSpPr>
+            <p:spPr>
+              <a:blipFill>
+                <a:blip r:embed="rId2"/>
+                <a:stretch>
+                  <a:fillRect l="-471" r="-471"/>
+                </a:stretch>
+              </a:blipFill>
+            </p:spPr>
+            <p:txBody>
+              <a:bodyPr/>
+              <a:lstStyle/>
+              <a:p>
+                <a:r>
+                  <a:rPr lang="it-IT">
+                    <a:noFill/>
+                  </a:rPr>
+                  <a:t> </a:t>
+                </a:r>
+              </a:p>
+            </p:txBody>
+          </p:sp>
+        </mc:Fallback>
+      </mc:AlternateContent>
+      <p:pic>
+        <p:nvPicPr>
+          <p:cNvPr id="8" name="Segnaposto contenuto 7">
+            <a:extLst>
+              <a:ext uri="{FF2B5EF4-FFF2-40B4-BE49-F238E27FC236}">
+                <a16:creationId xmlns:a16="http://schemas.microsoft.com/office/drawing/2014/main" id="{355F7F3B-1DBA-BC99-D7EB-E62FC0746465}"/>
+              </a:ext>
+            </a:extLst>
+          </p:cNvPr>
+          <p:cNvPicPr>
+            <a:picLocks noGrp="1" noChangeAspect="1"/>
+          </p:cNvPicPr>
+          <p:nvPr>
+            <p:ph sz="half" idx="2"/>
+          </p:nvPr>
+        </p:nvPicPr>
+        <p:blipFill>
+          <a:blip r:embed="rId3">
+            <a:extLst>
+              <a:ext uri="{28A0092B-C50C-407E-A947-70E740481C1C}">
+                <a14:useLocalDpi xmlns:a14="http://schemas.microsoft.com/office/drawing/2010/main" val="0"/>
+              </a:ext>
+            </a:extLst>
+          </a:blip>
+          <a:stretch>
+            <a:fillRect/>
+          </a:stretch>
+        </p:blipFill>
+        <p:spPr>
+          <a:xfrm>
+            <a:off x="6096000" y="1459692"/>
+            <a:ext cx="5504329" cy="4558477"/>
+          </a:xfrm>
+        </p:spPr>
+      </p:pic>
+      <p:sp>
+        <p:nvSpPr>
+          <p:cNvPr id="5" name="Segnaposto piè di pagina 4">
+            <a:extLst>
+              <a:ext uri="{FF2B5EF4-FFF2-40B4-BE49-F238E27FC236}">
+                <a16:creationId xmlns:a16="http://schemas.microsoft.com/office/drawing/2014/main" id="{349EBFC9-72C5-4AB1-DD07-B9BA586039F7}"/>
+              </a:ext>
+            </a:extLst>
+          </p:cNvPr>
+          <p:cNvSpPr>
+            <a:spLocks noGrp="1"/>
+          </p:cNvSpPr>
+          <p:nvPr>
+            <p:ph type="ftr" sz="quarter" idx="11"/>
+          </p:nvPr>
+        </p:nvSpPr>
+        <p:spPr/>
+        <p:txBody>
+          <a:bodyPr/>
+          <a:lstStyle/>
+          <a:p>
+            <a:r>
+              <a:rPr lang="it-IT"/>
+              <a:t>Prova finale: Introduzione all’Analisi di Missioni Spaziali</a:t>
+            </a:r>
+          </a:p>
+        </p:txBody>
+      </p:sp>
+      <p:sp>
+        <p:nvSpPr>
+          <p:cNvPr id="6" name="Segnaposto numero diapositiva 5">
+            <a:extLst>
+              <a:ext uri="{FF2B5EF4-FFF2-40B4-BE49-F238E27FC236}">
+                <a16:creationId xmlns:a16="http://schemas.microsoft.com/office/drawing/2014/main" id="{DF7BC08F-B3A7-FD0D-0053-2320BA27588F}"/>
+              </a:ext>
+            </a:extLst>
+          </p:cNvPr>
+          <p:cNvSpPr>
+            <a:spLocks noGrp="1"/>
+          </p:cNvSpPr>
+          <p:nvPr>
+            <p:ph type="sldNum" sz="quarter" idx="12"/>
+          </p:nvPr>
+        </p:nvSpPr>
+        <p:spPr/>
+        <p:txBody>
+          <a:bodyPr/>
+          <a:lstStyle/>
+          <a:p>
+            <a:fld id="{07ED6331-BE36-4EB0-BAD8-FC72B96BFAEC}" type="slidenum">
+              <a:rPr lang="it-IT" smtClean="0"/>
+              <a:pPr/>
+              <a:t>15</a:t>
+            </a:fld>
+            <a:endParaRPr lang="it-IT"/>
+          </a:p>
+        </p:txBody>
+      </p:sp>
+    </p:spTree>
+    <p:extLst>
+      <p:ext uri="{BB962C8B-B14F-4D97-AF65-F5344CB8AC3E}">
+        <p14:creationId xmlns:p14="http://schemas.microsoft.com/office/powerpoint/2010/main" val="2007573997"/>
+      </p:ext>
+    </p:extLst>
+  </p:cSld>
+  <p:clrMapOvr>
+    <a:masterClrMapping/>
+  </p:clrMapOvr>
+</p:sld>
+</file>
+
+<file path=ppt/slides/slide16.xml><?xml version="1.0" encoding="utf-8"?>
+<p:sld xmlns:a="http://schemas.openxmlformats.org/drawingml/2006/main" xmlns:r="http://schemas.openxmlformats.org/officeDocument/2006/relationships" xmlns:p="http://schemas.openxmlformats.org/presentationml/2006/main">
+  <p:cSld>
+    <p:spTree>
+      <p:nvGrpSpPr>
+        <p:cNvPr id="1" name=""/>
+        <p:cNvGrpSpPr/>
+        <p:nvPr/>
+      </p:nvGrpSpPr>
+      <p:grpSpPr>
+        <a:xfrm>
+          <a:off x="0" y="0"/>
+          <a:ext cx="0" cy="0"/>
+          <a:chOff x="0" y="0"/>
+          <a:chExt cx="0" cy="0"/>
+        </a:xfrm>
+      </p:grpSpPr>
+      <p:sp>
+        <p:nvSpPr>
+          <p:cNvPr id="2" name="Titolo 1">
+            <a:extLst>
+              <a:ext uri="{FF2B5EF4-FFF2-40B4-BE49-F238E27FC236}">
+                <a16:creationId xmlns:a16="http://schemas.microsoft.com/office/drawing/2014/main" id="{C0722FFF-BDAA-66D0-6397-FBB0CD4A237A}"/>
+              </a:ext>
+            </a:extLst>
+          </p:cNvPr>
+          <p:cNvSpPr>
+            <a:spLocks noGrp="1"/>
+          </p:cNvSpPr>
+          <p:nvPr>
+            <p:ph type="title"/>
+          </p:nvPr>
+        </p:nvSpPr>
+        <p:spPr>
+          <a:xfrm>
+            <a:off x="838200" y="415400"/>
+            <a:ext cx="7304179" cy="590931"/>
+          </a:xfrm>
+        </p:spPr>
+        <p:txBody>
+          <a:bodyPr/>
+          <a:lstStyle/>
+          <a:p>
+            <a:r>
+              <a:rPr lang="it-IT" dirty="0"/>
+              <a:t>Alternativa 3: manovra di cambio piano</a:t>
+            </a:r>
+          </a:p>
+        </p:txBody>
+      </p:sp>
+      <mc:AlternateContent xmlns:mc="http://schemas.openxmlformats.org/markup-compatibility/2006">
+        <mc:Choice xmlns:a14="http://schemas.microsoft.com/office/drawing/2010/main" Requires="a14">
+          <p:sp>
+            <p:nvSpPr>
+              <p:cNvPr id="3" name="Segnaposto contenuto 2">
+                <a:extLst>
+                  <a:ext uri="{FF2B5EF4-FFF2-40B4-BE49-F238E27FC236}">
+                    <a16:creationId xmlns:a16="http://schemas.microsoft.com/office/drawing/2014/main" id="{DAC21FD3-3E1E-E6E0-5BD9-EEB20C93B667}"/>
+                  </a:ext>
+                </a:extLst>
+              </p:cNvPr>
+              <p:cNvSpPr>
+                <a:spLocks noGrp="1"/>
+              </p:cNvSpPr>
+              <p:nvPr>
+                <p:ph sz="half" idx="1"/>
+              </p:nvPr>
+            </p:nvSpPr>
+            <p:spPr/>
+            <p:txBody>
+              <a:bodyPr tIns="360000">
+                <a:normAutofit/>
+              </a:bodyPr>
+              <a:lstStyle/>
+              <a:p>
+                <a:pPr>
+                  <a:lnSpc>
+                    <a:spcPct val="150000"/>
+                  </a:lnSpc>
+                </a:pPr>
+                <a:r>
+                  <a:rPr lang="it-IT" sz="1800" b="1" dirty="0"/>
+                  <a:t>Parametri orbitali variati:</a:t>
+                </a:r>
+                <a:r>
+                  <a:rPr lang="it-IT" sz="1800" dirty="0"/>
+                  <a:t> </a:t>
+                </a:r>
+                <a14:m>
+                  <m:oMath xmlns:m="http://schemas.openxmlformats.org/officeDocument/2006/math">
+                    <m:r>
+                      <a:rPr lang="it-IT" sz="1800" b="0" i="1" smtClean="0">
+                        <a:latin typeface="Cambria Math" panose="02040503050406030204" pitchFamily="18" charset="0"/>
+                      </a:rPr>
+                      <m:t>𝑖</m:t>
+                    </m:r>
+                    <m:r>
+                      <a:rPr lang="it-IT" sz="1800" b="0" i="1" smtClean="0">
+                        <a:latin typeface="Cambria Math" panose="02040503050406030204" pitchFamily="18" charset="0"/>
+                      </a:rPr>
+                      <m:t>, </m:t>
+                    </m:r>
+                    <m:r>
+                      <m:rPr>
+                        <m:sty m:val="p"/>
+                      </m:rPr>
+                      <a:rPr lang="it-IT" sz="1800" b="0" i="0" smtClean="0">
+                        <a:latin typeface="Cambria Math" panose="02040503050406030204" pitchFamily="18" charset="0"/>
+                      </a:rPr>
+                      <m:t>Ω</m:t>
+                    </m:r>
+                    <m:r>
+                      <a:rPr lang="it-IT" sz="1800" b="0" i="0" smtClean="0">
+                        <a:latin typeface="Cambria Math" panose="02040503050406030204" pitchFamily="18" charset="0"/>
+                      </a:rPr>
+                      <m:t>, </m:t>
+                    </m:r>
+                    <m:r>
+                      <a:rPr lang="it-IT" sz="1800" b="0" i="1" smtClean="0">
+                        <a:latin typeface="Cambria Math" panose="02040503050406030204" pitchFamily="18" charset="0"/>
+                      </a:rPr>
+                      <m:t>𝜔</m:t>
+                    </m:r>
+                  </m:oMath>
+                </a14:m>
+                <a:endParaRPr lang="it-IT" sz="1800" dirty="0"/>
+              </a:p>
+              <a:p>
+                <a:pPr>
+                  <a:lnSpc>
+                    <a:spcPct val="150000"/>
+                  </a:lnSpc>
+                </a:pPr>
+                <a:r>
+                  <a:rPr lang="it-IT" sz="1800" b="1" dirty="0"/>
+                  <a:t>Passaggi effettuati:</a:t>
+                </a:r>
+              </a:p>
+              <a:p>
+                <a:pPr lvl="1">
+                  <a:lnSpc>
+                    <a:spcPct val="150000"/>
+                  </a:lnSpc>
+                </a:pPr>
+                <a:r>
+                  <a:rPr lang="it-IT" sz="1600" dirty="0"/>
+                  <a:t>Secondo impulso: </a:t>
+                </a:r>
+                <a14:m>
+                  <m:oMath xmlns:m="http://schemas.openxmlformats.org/officeDocument/2006/math">
+                    <m:r>
+                      <a:rPr lang="it-IT" sz="1600" b="1" i="0" smtClean="0">
+                        <a:latin typeface="Cambria Math" panose="02040503050406030204" pitchFamily="18" charset="0"/>
+                      </a:rPr>
+                      <m:t>𝚫</m:t>
+                    </m:r>
+                    <m:sSub>
+                      <m:sSubPr>
+                        <m:ctrlPr>
+                          <a:rPr lang="it-IT" sz="1600" b="1" i="1" smtClean="0">
+                            <a:latin typeface="Cambria Math" panose="02040503050406030204" pitchFamily="18" charset="0"/>
+                          </a:rPr>
+                        </m:ctrlPr>
+                      </m:sSubPr>
+                      <m:e>
+                        <m:r>
+                          <a:rPr lang="it-IT" sz="1600" b="1" i="1" smtClean="0">
+                            <a:latin typeface="Cambria Math" panose="02040503050406030204" pitchFamily="18" charset="0"/>
+                          </a:rPr>
+                          <m:t>𝒗</m:t>
+                        </m:r>
+                      </m:e>
+                      <m:sub>
+                        <m:r>
+                          <a:rPr lang="it-IT" sz="1600" b="1" i="1" smtClean="0">
+                            <a:latin typeface="Cambria Math" panose="02040503050406030204" pitchFamily="18" charset="0"/>
+                          </a:rPr>
+                          <m:t>𝟐</m:t>
+                        </m:r>
+                      </m:sub>
+                    </m:sSub>
+                  </m:oMath>
+                </a14:m>
+                <a:r>
+                  <a:rPr lang="it-IT" sz="1600" b="1" dirty="0"/>
+                  <a:t> = 4.6024 km/s</a:t>
+                </a:r>
+              </a:p>
+              <a:p>
+                <a:pPr lvl="1">
+                  <a:lnSpc>
+                    <a:spcPct val="150000"/>
+                  </a:lnSpc>
+                </a:pPr>
+                <a:r>
+                  <a:rPr lang="it-IT" sz="1600" dirty="0"/>
+                  <a:t>Percorrenza su orbita di cambio piano: </a:t>
+                </a:r>
+                <a14:m>
+                  <m:oMath xmlns:m="http://schemas.openxmlformats.org/officeDocument/2006/math">
+                    <m:r>
+                      <a:rPr lang="it-IT" sz="1600" b="1" i="0" smtClean="0">
+                        <a:latin typeface="Cambria Math" panose="02040503050406030204" pitchFamily="18" charset="0"/>
+                      </a:rPr>
+                      <m:t>𝚫</m:t>
+                    </m:r>
+                    <m:sSub>
+                      <m:sSubPr>
+                        <m:ctrlPr>
+                          <a:rPr lang="it-IT" sz="1600" b="1" i="1" smtClean="0">
+                            <a:latin typeface="Cambria Math" panose="02040503050406030204" pitchFamily="18" charset="0"/>
+                          </a:rPr>
+                        </m:ctrlPr>
+                      </m:sSubPr>
+                      <m:e>
+                        <m:r>
+                          <a:rPr lang="it-IT" sz="1600" b="1" i="1" smtClean="0">
+                            <a:latin typeface="Cambria Math" panose="02040503050406030204" pitchFamily="18" charset="0"/>
+                          </a:rPr>
+                          <m:t>𝒕</m:t>
+                        </m:r>
+                      </m:e>
+                      <m:sub>
+                        <m:r>
+                          <a:rPr lang="it-IT" sz="1600" b="1" i="1" smtClean="0">
+                            <a:latin typeface="Cambria Math" panose="02040503050406030204" pitchFamily="18" charset="0"/>
+                          </a:rPr>
+                          <m:t>𝟑</m:t>
+                        </m:r>
+                      </m:sub>
+                    </m:sSub>
+                  </m:oMath>
+                </a14:m>
+                <a:r>
+                  <a:rPr lang="it-IT" sz="1600" b="1" dirty="0"/>
+                  <a:t> = 8605 s</a:t>
+                </a:r>
+              </a:p>
+              <a:p>
+                <a:pPr>
+                  <a:lnSpc>
+                    <a:spcPct val="150000"/>
+                  </a:lnSpc>
+                </a:pPr>
+                <a:r>
+                  <a:rPr lang="it-IT" sz="1800" b="1" dirty="0"/>
+                  <a:t>Osservazioni:</a:t>
+                </a:r>
+              </a:p>
+              <a:p>
+                <a:pPr lvl="1">
+                  <a:lnSpc>
+                    <a:spcPct val="150000"/>
+                  </a:lnSpc>
+                </a:pPr>
+                <a:r>
+                  <a:rPr lang="it-IT" sz="1600" dirty="0"/>
+                  <a:t>L’</a:t>
+                </a:r>
+                <a:r>
+                  <a:rPr lang="it-IT" sz="1600" u="sng" dirty="0"/>
+                  <a:t>orbita di cambio piano e l’orbita finale sono allineate</a:t>
+                </a:r>
+                <a:r>
+                  <a:rPr lang="it-IT" sz="1600" dirty="0"/>
+                  <a:t>, come previsto in precedenza</a:t>
+                </a:r>
+              </a:p>
+              <a:p>
+                <a:pPr lvl="1">
+                  <a:lnSpc>
+                    <a:spcPct val="150000"/>
+                  </a:lnSpc>
+                </a:pPr>
+                <a:r>
+                  <a:rPr lang="it-IT" sz="1600" dirty="0"/>
+                  <a:t>Il </a:t>
+                </a:r>
+                <a:r>
+                  <a:rPr lang="it-IT" sz="1600" u="sng" dirty="0"/>
+                  <a:t>costo della manovra è esiguo</a:t>
+                </a:r>
+                <a:r>
+                  <a:rPr lang="it-IT" sz="1600" dirty="0"/>
+                  <a:t> se comparato ai cambi di piano visti nelle precedenti strategie</a:t>
+                </a:r>
+              </a:p>
+            </p:txBody>
+          </p:sp>
+        </mc:Choice>
+        <mc:Fallback>
+          <p:sp>
+            <p:nvSpPr>
+              <p:cNvPr id="3" name="Segnaposto contenuto 2">
+                <a:extLst>
+                  <a:ext uri="{FF2B5EF4-FFF2-40B4-BE49-F238E27FC236}">
+                    <a16:creationId xmlns:a16="http://schemas.microsoft.com/office/drawing/2014/main" id="{DAC21FD3-3E1E-E6E0-5BD9-EEB20C93B667}"/>
+                  </a:ext>
+                </a:extLst>
+              </p:cNvPr>
+              <p:cNvSpPr>
+                <a:spLocks noGrp="1" noRot="1" noChangeAspect="1" noMove="1" noResize="1" noEditPoints="1" noAdjustHandles="1" noChangeArrowheads="1" noChangeShapeType="1" noTextEdit="1"/>
+              </p:cNvSpPr>
+              <p:nvPr>
+                <p:ph sz="half" idx="1"/>
+              </p:nvPr>
+            </p:nvSpPr>
+            <p:spPr>
+              <a:blipFill>
+                <a:blip r:embed="rId2"/>
+                <a:stretch>
+                  <a:fillRect l="-824"/>
+                </a:stretch>
+              </a:blipFill>
+            </p:spPr>
+            <p:txBody>
+              <a:bodyPr/>
+              <a:lstStyle/>
+              <a:p>
+                <a:r>
+                  <a:rPr lang="it-IT">
+                    <a:noFill/>
+                  </a:rPr>
+                  <a:t> </a:t>
+                </a:r>
+              </a:p>
+            </p:txBody>
+          </p:sp>
+        </mc:Fallback>
+      </mc:AlternateContent>
+      <p:pic>
+        <p:nvPicPr>
+          <p:cNvPr id="10" name="Segnaposto contenuto 9">
+            <a:extLst>
+              <a:ext uri="{FF2B5EF4-FFF2-40B4-BE49-F238E27FC236}">
+                <a16:creationId xmlns:a16="http://schemas.microsoft.com/office/drawing/2014/main" id="{B383F42B-37F8-071A-BBFC-A1963D704A05}"/>
+              </a:ext>
+            </a:extLst>
+          </p:cNvPr>
+          <p:cNvPicPr>
+            <a:picLocks noGrp="1" noChangeAspect="1"/>
+          </p:cNvPicPr>
+          <p:nvPr>
+            <p:ph sz="half" idx="2"/>
+          </p:nvPr>
+        </p:nvPicPr>
+        <p:blipFill>
+          <a:blip r:embed="rId3">
+            <a:extLst>
+              <a:ext uri="{28A0092B-C50C-407E-A947-70E740481C1C}">
+                <a14:useLocalDpi xmlns:a14="http://schemas.microsoft.com/office/drawing/2010/main" val="0"/>
+              </a:ext>
+            </a:extLst>
+          </a:blip>
+          <a:srcRect/>
+          <a:stretch/>
+        </p:blipFill>
+        <p:spPr>
+          <a:xfrm>
+            <a:off x="6096001" y="1152835"/>
+            <a:ext cx="5553633" cy="5172191"/>
+          </a:xfrm>
+        </p:spPr>
+      </p:pic>
+      <p:sp>
+        <p:nvSpPr>
+          <p:cNvPr id="5" name="Segnaposto piè di pagina 4">
+            <a:extLst>
+              <a:ext uri="{FF2B5EF4-FFF2-40B4-BE49-F238E27FC236}">
+                <a16:creationId xmlns:a16="http://schemas.microsoft.com/office/drawing/2014/main" id="{C9D0F362-9997-81AA-3826-4A9939B09E5E}"/>
+              </a:ext>
+            </a:extLst>
+          </p:cNvPr>
+          <p:cNvSpPr>
+            <a:spLocks noGrp="1"/>
+          </p:cNvSpPr>
+          <p:nvPr>
+            <p:ph type="ftr" sz="quarter" idx="11"/>
+          </p:nvPr>
+        </p:nvSpPr>
+        <p:spPr/>
+        <p:txBody>
+          <a:bodyPr/>
+          <a:lstStyle/>
+          <a:p>
+            <a:r>
+              <a:rPr lang="it-IT"/>
+              <a:t>Prova finale: Introduzione all’Analisi di Missioni Spaziali</a:t>
+            </a:r>
+          </a:p>
+        </p:txBody>
+      </p:sp>
+      <p:sp>
+        <p:nvSpPr>
+          <p:cNvPr id="6" name="Segnaposto numero diapositiva 5">
+            <a:extLst>
+              <a:ext uri="{FF2B5EF4-FFF2-40B4-BE49-F238E27FC236}">
+                <a16:creationId xmlns:a16="http://schemas.microsoft.com/office/drawing/2014/main" id="{F1994408-34CA-C877-9635-A7762CC880AD}"/>
+              </a:ext>
+            </a:extLst>
+          </p:cNvPr>
+          <p:cNvSpPr>
+            <a:spLocks noGrp="1"/>
+          </p:cNvSpPr>
+          <p:nvPr>
+            <p:ph type="sldNum" sz="quarter" idx="12"/>
+          </p:nvPr>
+        </p:nvSpPr>
+        <p:spPr/>
+        <p:txBody>
+          <a:bodyPr/>
+          <a:lstStyle/>
+          <a:p>
+            <a:fld id="{07ED6331-BE36-4EB0-BAD8-FC72B96BFAEC}" type="slidenum">
+              <a:rPr lang="it-IT" smtClean="0"/>
+              <a:pPr/>
+              <a:t>16</a:t>
+            </a:fld>
+            <a:endParaRPr lang="it-IT"/>
+          </a:p>
+        </p:txBody>
+      </p:sp>
+    </p:spTree>
+    <p:extLst>
+      <p:ext uri="{BB962C8B-B14F-4D97-AF65-F5344CB8AC3E}">
+        <p14:creationId xmlns:p14="http://schemas.microsoft.com/office/powerpoint/2010/main" val="54116075"/>
+      </p:ext>
+    </p:extLst>
+  </p:cSld>
+  <p:clrMapOvr>
+    <a:masterClrMapping/>
+  </p:clrMapOvr>
+</p:sld>
+</file>
+
+<file path=ppt/slides/slide17.xml><?xml version="1.0" encoding="utf-8"?>
+<p:sld xmlns:a="http://schemas.openxmlformats.org/drawingml/2006/main" xmlns:r="http://schemas.openxmlformats.org/officeDocument/2006/relationships" xmlns:p="http://schemas.openxmlformats.org/presentationml/2006/main">
+  <p:cSld>
+    <p:spTree>
+      <p:nvGrpSpPr>
+        <p:cNvPr id="1" name=""/>
+        <p:cNvGrpSpPr/>
+        <p:nvPr/>
+      </p:nvGrpSpPr>
+      <p:grpSpPr>
+        <a:xfrm>
+          <a:off x="0" y="0"/>
+          <a:ext cx="0" cy="0"/>
+          <a:chOff x="0" y="0"/>
+          <a:chExt cx="0" cy="0"/>
+        </a:xfrm>
+      </p:grpSpPr>
+      <p:sp>
+        <p:nvSpPr>
+          <p:cNvPr id="2" name="Titolo 1">
+            <a:extLst>
+              <a:ext uri="{FF2B5EF4-FFF2-40B4-BE49-F238E27FC236}">
+                <a16:creationId xmlns:a16="http://schemas.microsoft.com/office/drawing/2014/main" id="{174E1623-5E3A-7C6B-484D-353B826DBB29}"/>
+              </a:ext>
+            </a:extLst>
+          </p:cNvPr>
+          <p:cNvSpPr>
+            <a:spLocks noGrp="1"/>
+          </p:cNvSpPr>
+          <p:nvPr>
+            <p:ph type="title"/>
+          </p:nvPr>
+        </p:nvSpPr>
+        <p:spPr>
+          <a:xfrm>
+            <a:off x="838200" y="415400"/>
+            <a:ext cx="6962547" cy="590931"/>
+          </a:xfrm>
+        </p:spPr>
+        <p:txBody>
+          <a:bodyPr/>
+          <a:lstStyle/>
+          <a:p>
+            <a:r>
+              <a:rPr lang="it-IT" dirty="0"/>
+              <a:t>Alternativa 3: manovra bitangente AP</a:t>
+            </a:r>
+          </a:p>
+        </p:txBody>
+      </p:sp>
+      <mc:AlternateContent xmlns:mc="http://schemas.openxmlformats.org/markup-compatibility/2006">
+        <mc:Choice xmlns:a14="http://schemas.microsoft.com/office/drawing/2010/main" Requires="a14">
+          <p:sp>
+            <p:nvSpPr>
+              <p:cNvPr id="3" name="Segnaposto contenuto 2">
+                <a:extLst>
+                  <a:ext uri="{FF2B5EF4-FFF2-40B4-BE49-F238E27FC236}">
+                    <a16:creationId xmlns:a16="http://schemas.microsoft.com/office/drawing/2014/main" id="{ACE70B3E-C77D-E0C3-B156-B147F6790FAF}"/>
+                  </a:ext>
+                </a:extLst>
+              </p:cNvPr>
+              <p:cNvSpPr>
+                <a:spLocks noGrp="1"/>
+              </p:cNvSpPr>
+              <p:nvPr>
+                <p:ph sz="half" idx="1"/>
+              </p:nvPr>
+            </p:nvSpPr>
+            <p:spPr/>
+            <p:txBody>
+              <a:bodyPr tIns="180000">
+                <a:normAutofit lnSpcReduction="10000"/>
+              </a:bodyPr>
+              <a:lstStyle/>
+              <a:p>
+                <a:pPr>
+                  <a:lnSpc>
+                    <a:spcPct val="120000"/>
+                  </a:lnSpc>
+                </a:pPr>
+                <a:r>
+                  <a:rPr lang="it-IT" sz="1800" b="1" dirty="0"/>
+                  <a:t>Parametri orbitali variati:</a:t>
+                </a:r>
+                <a:r>
+                  <a:rPr lang="it-IT" sz="1800" dirty="0"/>
+                  <a:t> </a:t>
+                </a:r>
+                <a14:m>
+                  <m:oMath xmlns:m="http://schemas.openxmlformats.org/officeDocument/2006/math">
+                    <m:r>
+                      <a:rPr lang="it-IT" sz="1800" b="0" i="1" smtClean="0">
+                        <a:latin typeface="Cambria Math" panose="02040503050406030204" pitchFamily="18" charset="0"/>
+                      </a:rPr>
+                      <m:t>𝑎</m:t>
+                    </m:r>
+                    <m:r>
+                      <a:rPr lang="it-IT" sz="1800" b="0" i="1" smtClean="0">
+                        <a:latin typeface="Cambria Math" panose="02040503050406030204" pitchFamily="18" charset="0"/>
+                      </a:rPr>
+                      <m:t>, </m:t>
+                    </m:r>
+                    <m:r>
+                      <a:rPr lang="it-IT" sz="1800" b="0" i="1" smtClean="0">
+                        <a:latin typeface="Cambria Math" panose="02040503050406030204" pitchFamily="18" charset="0"/>
+                      </a:rPr>
+                      <m:t>𝑒</m:t>
+                    </m:r>
+                  </m:oMath>
+                </a14:m>
+                <a:endParaRPr lang="it-IT" sz="1800" dirty="0"/>
+              </a:p>
+              <a:p>
+                <a:pPr>
+                  <a:lnSpc>
+                    <a:spcPct val="120000"/>
+                  </a:lnSpc>
+                </a:pPr>
+                <a:r>
+                  <a:rPr lang="it-IT" sz="1800" b="1" dirty="0"/>
+                  <a:t>Passaggi effettuati:</a:t>
+                </a:r>
+              </a:p>
+              <a:p>
+                <a:pPr lvl="1">
+                  <a:lnSpc>
+                    <a:spcPct val="120000"/>
+                  </a:lnSpc>
+                </a:pPr>
+                <a:r>
+                  <a:rPr lang="it-IT" sz="1600" dirty="0"/>
+                  <a:t>Terzo impulso: </a:t>
+                </a:r>
+                <a14:m>
+                  <m:oMath xmlns:m="http://schemas.openxmlformats.org/officeDocument/2006/math">
+                    <m:r>
+                      <a:rPr lang="it-IT" sz="1600" b="1" i="0" smtClean="0">
+                        <a:latin typeface="Cambria Math" panose="02040503050406030204" pitchFamily="18" charset="0"/>
+                      </a:rPr>
+                      <m:t>𝚫</m:t>
+                    </m:r>
+                    <m:sSub>
+                      <m:sSubPr>
+                        <m:ctrlPr>
+                          <a:rPr lang="it-IT" sz="1600" b="1" i="1" smtClean="0">
+                            <a:latin typeface="Cambria Math" panose="02040503050406030204" pitchFamily="18" charset="0"/>
+                          </a:rPr>
+                        </m:ctrlPr>
+                      </m:sSubPr>
+                      <m:e>
+                        <m:r>
+                          <a:rPr lang="it-IT" sz="1600" b="1" i="1" smtClean="0">
+                            <a:latin typeface="Cambria Math" panose="02040503050406030204" pitchFamily="18" charset="0"/>
+                          </a:rPr>
+                          <m:t>𝒗</m:t>
+                        </m:r>
+                      </m:e>
+                      <m:sub>
+                        <m:r>
+                          <a:rPr lang="it-IT" sz="1600" b="1" i="1" smtClean="0">
+                            <a:latin typeface="Cambria Math" panose="02040503050406030204" pitchFamily="18" charset="0"/>
+                          </a:rPr>
+                          <m:t>𝟑</m:t>
+                        </m:r>
+                      </m:sub>
+                    </m:sSub>
+                  </m:oMath>
+                </a14:m>
+                <a:r>
+                  <a:rPr lang="it-IT" sz="1600" b="1" dirty="0"/>
+                  <a:t> = 0.1338 km/s</a:t>
+                </a:r>
+              </a:p>
+              <a:p>
+                <a:pPr lvl="1">
+                  <a:lnSpc>
+                    <a:spcPct val="120000"/>
+                  </a:lnSpc>
+                </a:pPr>
+                <a:r>
+                  <a:rPr lang="it-IT" sz="1600" dirty="0"/>
+                  <a:t>Percorrenza su orbita bitangente: </a:t>
+                </a:r>
+                <a14:m>
+                  <m:oMath xmlns:m="http://schemas.openxmlformats.org/officeDocument/2006/math">
+                    <m:r>
+                      <a:rPr lang="it-IT" sz="1600" b="1" i="0" smtClean="0">
+                        <a:latin typeface="Cambria Math" panose="02040503050406030204" pitchFamily="18" charset="0"/>
+                      </a:rPr>
+                      <m:t>𝚫</m:t>
+                    </m:r>
+                    <m:sSub>
+                      <m:sSubPr>
+                        <m:ctrlPr>
+                          <a:rPr lang="it-IT" sz="1600" b="1" i="1" smtClean="0">
+                            <a:latin typeface="Cambria Math" panose="02040503050406030204" pitchFamily="18" charset="0"/>
+                          </a:rPr>
+                        </m:ctrlPr>
+                      </m:sSubPr>
+                      <m:e>
+                        <m:r>
+                          <a:rPr lang="it-IT" sz="1600" b="1" i="1" smtClean="0">
+                            <a:latin typeface="Cambria Math" panose="02040503050406030204" pitchFamily="18" charset="0"/>
+                          </a:rPr>
+                          <m:t>𝒕</m:t>
+                        </m:r>
+                      </m:e>
+                      <m:sub>
+                        <m:r>
+                          <a:rPr lang="it-IT" sz="1600" b="1" i="1" smtClean="0">
+                            <a:latin typeface="Cambria Math" panose="02040503050406030204" pitchFamily="18" charset="0"/>
+                          </a:rPr>
+                          <m:t>𝟒</m:t>
+                        </m:r>
+                      </m:sub>
+                    </m:sSub>
+                  </m:oMath>
+                </a14:m>
+                <a:r>
+                  <a:rPr lang="it-IT" sz="1600" b="1" dirty="0"/>
+                  <a:t> = 5632 s</a:t>
+                </a:r>
+              </a:p>
+              <a:p>
+                <a:pPr lvl="1">
+                  <a:lnSpc>
+                    <a:spcPct val="120000"/>
+                  </a:lnSpc>
+                </a:pPr>
+                <a:r>
+                  <a:rPr lang="it-IT" sz="1600" dirty="0"/>
+                  <a:t>Quarto impulso: </a:t>
+                </a:r>
+                <a14:m>
+                  <m:oMath xmlns:m="http://schemas.openxmlformats.org/officeDocument/2006/math">
+                    <m:r>
+                      <a:rPr lang="it-IT" sz="1600" b="1" i="0" smtClean="0">
+                        <a:latin typeface="Cambria Math" panose="02040503050406030204" pitchFamily="18" charset="0"/>
+                      </a:rPr>
+                      <m:t>𝚫</m:t>
+                    </m:r>
+                    <m:sSub>
+                      <m:sSubPr>
+                        <m:ctrlPr>
+                          <a:rPr lang="it-IT" sz="1600" b="1" i="1" smtClean="0">
+                            <a:latin typeface="Cambria Math" panose="02040503050406030204" pitchFamily="18" charset="0"/>
+                          </a:rPr>
+                        </m:ctrlPr>
+                      </m:sSubPr>
+                      <m:e>
+                        <m:r>
+                          <a:rPr lang="it-IT" sz="1600" b="1" i="1" smtClean="0">
+                            <a:latin typeface="Cambria Math" panose="02040503050406030204" pitchFamily="18" charset="0"/>
+                          </a:rPr>
+                          <m:t>𝒗</m:t>
+                        </m:r>
+                      </m:e>
+                      <m:sub>
+                        <m:r>
+                          <a:rPr lang="it-IT" sz="1600" b="1" i="1" smtClean="0">
+                            <a:latin typeface="Cambria Math" panose="02040503050406030204" pitchFamily="18" charset="0"/>
+                          </a:rPr>
+                          <m:t>𝟒</m:t>
+                        </m:r>
+                      </m:sub>
+                    </m:sSub>
+                  </m:oMath>
+                </a14:m>
+                <a:r>
+                  <a:rPr lang="it-IT" sz="1600" b="1" dirty="0"/>
+                  <a:t> = 0.00004 km/s</a:t>
+                </a:r>
+                <a:endParaRPr lang="it-IT" sz="1600" dirty="0"/>
+              </a:p>
+              <a:p>
+                <a:pPr lvl="1">
+                  <a:lnSpc>
+                    <a:spcPct val="120000"/>
+                  </a:lnSpc>
+                </a:pPr>
+                <a:r>
+                  <a:rPr lang="it-IT" sz="1600" dirty="0"/>
+                  <a:t>Percorrenza su orbita finale: </a:t>
+                </a:r>
+                <a14:m>
+                  <m:oMath xmlns:m="http://schemas.openxmlformats.org/officeDocument/2006/math">
+                    <m:r>
+                      <a:rPr lang="it-IT" sz="1600" b="1" i="0" smtClean="0">
+                        <a:latin typeface="Cambria Math" panose="02040503050406030204" pitchFamily="18" charset="0"/>
+                      </a:rPr>
+                      <m:t>𝚫</m:t>
+                    </m:r>
+                    <m:sSub>
+                      <m:sSubPr>
+                        <m:ctrlPr>
+                          <a:rPr lang="it-IT" sz="1600" b="1" i="1" smtClean="0">
+                            <a:latin typeface="Cambria Math" panose="02040503050406030204" pitchFamily="18" charset="0"/>
+                          </a:rPr>
+                        </m:ctrlPr>
+                      </m:sSubPr>
+                      <m:e>
+                        <m:r>
+                          <a:rPr lang="it-IT" sz="1600" b="1" i="1" smtClean="0">
+                            <a:latin typeface="Cambria Math" panose="02040503050406030204" pitchFamily="18" charset="0"/>
+                          </a:rPr>
+                          <m:t>𝒕</m:t>
+                        </m:r>
+                      </m:e>
+                      <m:sub>
+                        <m:r>
+                          <a:rPr lang="it-IT" sz="1600" b="1" i="1" smtClean="0">
+                            <a:latin typeface="Cambria Math" panose="02040503050406030204" pitchFamily="18" charset="0"/>
+                          </a:rPr>
+                          <m:t>𝟓</m:t>
+                        </m:r>
+                      </m:sub>
+                    </m:sSub>
+                  </m:oMath>
+                </a14:m>
+                <a:r>
+                  <a:rPr lang="it-IT" sz="1600" b="1" dirty="0"/>
+                  <a:t> = 362 s</a:t>
+                </a:r>
+                <a:endParaRPr lang="it-IT" sz="1600" dirty="0"/>
+              </a:p>
+              <a:p>
+                <a:pPr>
+                  <a:lnSpc>
+                    <a:spcPct val="120000"/>
+                  </a:lnSpc>
+                </a:pPr>
+                <a:r>
+                  <a:rPr lang="it-IT" sz="1800" b="1" dirty="0"/>
+                  <a:t>Osservazioni:</a:t>
+                </a:r>
+              </a:p>
+              <a:p>
+                <a:pPr lvl="1">
+                  <a:lnSpc>
+                    <a:spcPct val="120000"/>
+                  </a:lnSpc>
+                </a:pPr>
+                <a:r>
+                  <a:rPr lang="it-IT" sz="1600" dirty="0"/>
+                  <a:t>Il secondo impulso della manovra è esiguo in quanto gli apocentri delle orbite di cambio piano e finale sono molto vicini tra loro (323 m di distanza)</a:t>
+                </a:r>
+              </a:p>
+              <a:p>
+                <a:pPr lvl="1">
+                  <a:lnSpc>
+                    <a:spcPct val="120000"/>
+                  </a:lnSpc>
+                </a:pPr>
+                <a:r>
+                  <a:rPr lang="it-IT" sz="1600" dirty="0"/>
+                  <a:t>Sarebbe possibile sostituire la manovra con un singolo impulso nell’</a:t>
+                </a:r>
+                <a:r>
+                  <a:rPr lang="it-IT" sz="1600" dirty="0" err="1"/>
+                  <a:t>apocentro</a:t>
+                </a:r>
+                <a:r>
+                  <a:rPr lang="it-IT" sz="1600" dirty="0"/>
+                  <a:t> imponendo la coincidenza dei due apocentri invece di </a:t>
+                </a:r>
+                <a14:m>
+                  <m:oMath xmlns:m="http://schemas.openxmlformats.org/officeDocument/2006/math">
+                    <m:r>
+                      <m:rPr>
+                        <m:sty m:val="p"/>
+                      </m:rPr>
+                      <a:rPr lang="it-IT" sz="1600" b="0" i="0" smtClean="0">
+                        <a:latin typeface="Cambria Math" panose="02040503050406030204" pitchFamily="18" charset="0"/>
+                      </a:rPr>
+                      <m:t>Δ</m:t>
+                    </m:r>
+                    <m:sSub>
+                      <m:sSubPr>
+                        <m:ctrlPr>
+                          <a:rPr lang="it-IT" sz="1600" b="0" i="1" smtClean="0">
+                            <a:latin typeface="Cambria Math" panose="02040503050406030204" pitchFamily="18" charset="0"/>
+                          </a:rPr>
+                        </m:ctrlPr>
+                      </m:sSubPr>
+                      <m:e>
+                        <m:r>
+                          <a:rPr lang="it-IT" sz="1600" b="0" i="1" smtClean="0">
+                            <a:latin typeface="Cambria Math" panose="02040503050406030204" pitchFamily="18" charset="0"/>
+                          </a:rPr>
+                          <m:t>𝑣</m:t>
+                        </m:r>
+                      </m:e>
+                      <m:sub>
+                        <m:r>
+                          <a:rPr lang="it-IT" sz="1600" b="0" i="1" smtClean="0">
+                            <a:latin typeface="Cambria Math" panose="02040503050406030204" pitchFamily="18" charset="0"/>
+                          </a:rPr>
+                          <m:t>1</m:t>
+                        </m:r>
+                      </m:sub>
+                    </m:sSub>
+                  </m:oMath>
+                </a14:m>
+                <a:r>
+                  <a:rPr lang="it-IT" sz="1600" dirty="0"/>
+                  <a:t> durante la definizione della manovra tangente</a:t>
+                </a:r>
+              </a:p>
+            </p:txBody>
+          </p:sp>
+        </mc:Choice>
+        <mc:Fallback>
+          <p:sp>
+            <p:nvSpPr>
+              <p:cNvPr id="3" name="Segnaposto contenuto 2">
+                <a:extLst>
+                  <a:ext uri="{FF2B5EF4-FFF2-40B4-BE49-F238E27FC236}">
+                    <a16:creationId xmlns:a16="http://schemas.microsoft.com/office/drawing/2014/main" id="{ACE70B3E-C77D-E0C3-B156-B147F6790FAF}"/>
+                  </a:ext>
+                </a:extLst>
+              </p:cNvPr>
+              <p:cNvSpPr>
+                <a:spLocks noGrp="1" noRot="1" noChangeAspect="1" noMove="1" noResize="1" noEditPoints="1" noAdjustHandles="1" noChangeArrowheads="1" noChangeShapeType="1" noTextEdit="1"/>
+              </p:cNvSpPr>
+              <p:nvPr>
+                <p:ph sz="half" idx="1"/>
+              </p:nvPr>
+            </p:nvSpPr>
+            <p:spPr>
+              <a:blipFill>
+                <a:blip r:embed="rId2"/>
+                <a:stretch>
+                  <a:fillRect l="-824" r="-1059"/>
+                </a:stretch>
+              </a:blipFill>
+            </p:spPr>
+            <p:txBody>
+              <a:bodyPr/>
+              <a:lstStyle/>
+              <a:p>
+                <a:r>
+                  <a:rPr lang="it-IT">
+                    <a:noFill/>
+                  </a:rPr>
+                  <a:t> </a:t>
+                </a:r>
+              </a:p>
+            </p:txBody>
+          </p:sp>
+        </mc:Fallback>
+      </mc:AlternateContent>
+      <p:pic>
+        <p:nvPicPr>
+          <p:cNvPr id="8" name="Segnaposto contenuto 7">
+            <a:extLst>
+              <a:ext uri="{FF2B5EF4-FFF2-40B4-BE49-F238E27FC236}">
+                <a16:creationId xmlns:a16="http://schemas.microsoft.com/office/drawing/2014/main" id="{3F1A31D8-8D18-884E-AA64-B3DE6981DB09}"/>
+              </a:ext>
+            </a:extLst>
+          </p:cNvPr>
+          <p:cNvPicPr>
+            <a:picLocks noGrp="1" noChangeAspect="1"/>
+          </p:cNvPicPr>
+          <p:nvPr>
+            <p:ph sz="half" idx="2"/>
+          </p:nvPr>
+        </p:nvPicPr>
+        <p:blipFill>
+          <a:blip r:embed="rId3">
+            <a:extLst>
+              <a:ext uri="{28A0092B-C50C-407E-A947-70E740481C1C}">
+                <a14:useLocalDpi xmlns:a14="http://schemas.microsoft.com/office/drawing/2010/main" val="0"/>
+              </a:ext>
+            </a:extLst>
+          </a:blip>
+          <a:srcRect/>
+          <a:stretch/>
+        </p:blipFill>
+        <p:spPr>
+          <a:xfrm>
+            <a:off x="6096000" y="1156115"/>
+            <a:ext cx="5558117" cy="5165631"/>
+          </a:xfrm>
+        </p:spPr>
+      </p:pic>
+      <p:sp>
+        <p:nvSpPr>
+          <p:cNvPr id="5" name="Segnaposto piè di pagina 4">
+            <a:extLst>
+              <a:ext uri="{FF2B5EF4-FFF2-40B4-BE49-F238E27FC236}">
+                <a16:creationId xmlns:a16="http://schemas.microsoft.com/office/drawing/2014/main" id="{CC6D556A-39C0-3A67-18BF-5CD069E1142D}"/>
+              </a:ext>
+            </a:extLst>
+          </p:cNvPr>
+          <p:cNvSpPr>
+            <a:spLocks noGrp="1"/>
+          </p:cNvSpPr>
+          <p:nvPr>
+            <p:ph type="ftr" sz="quarter" idx="11"/>
+          </p:nvPr>
+        </p:nvSpPr>
+        <p:spPr/>
+        <p:txBody>
+          <a:bodyPr/>
+          <a:lstStyle/>
+          <a:p>
+            <a:r>
+              <a:rPr lang="it-IT"/>
+              <a:t>Prova finale: Introduzione all’Analisi di Missioni Spaziali</a:t>
+            </a:r>
+          </a:p>
+        </p:txBody>
+      </p:sp>
+      <p:sp>
+        <p:nvSpPr>
+          <p:cNvPr id="6" name="Segnaposto numero diapositiva 5">
+            <a:extLst>
+              <a:ext uri="{FF2B5EF4-FFF2-40B4-BE49-F238E27FC236}">
+                <a16:creationId xmlns:a16="http://schemas.microsoft.com/office/drawing/2014/main" id="{2ACBC6A6-33F2-E093-2636-578942204A34}"/>
+              </a:ext>
+            </a:extLst>
+          </p:cNvPr>
+          <p:cNvSpPr>
+            <a:spLocks noGrp="1"/>
+          </p:cNvSpPr>
+          <p:nvPr>
+            <p:ph type="sldNum" sz="quarter" idx="12"/>
+          </p:nvPr>
+        </p:nvSpPr>
+        <p:spPr/>
+        <p:txBody>
+          <a:bodyPr/>
+          <a:lstStyle/>
+          <a:p>
+            <a:fld id="{07ED6331-BE36-4EB0-BAD8-FC72B96BFAEC}" type="slidenum">
+              <a:rPr lang="it-IT" smtClean="0"/>
+              <a:pPr/>
+              <a:t>17</a:t>
+            </a:fld>
+            <a:endParaRPr lang="it-IT"/>
+          </a:p>
+        </p:txBody>
+      </p:sp>
+    </p:spTree>
+    <p:extLst>
+      <p:ext uri="{BB962C8B-B14F-4D97-AF65-F5344CB8AC3E}">
+        <p14:creationId xmlns:p14="http://schemas.microsoft.com/office/powerpoint/2010/main" val="451679681"/>
+      </p:ext>
+    </p:extLst>
+  </p:cSld>
+  <p:clrMapOvr>
+    <a:masterClrMapping/>
+  </p:clrMapOvr>
+</p:sld>
+</file>
+
+<file path=ppt/slides/slide18.xml><?xml version="1.0" encoding="utf-8"?>
+<p:sld xmlns:a="http://schemas.openxmlformats.org/drawingml/2006/main" xmlns:r="http://schemas.openxmlformats.org/officeDocument/2006/relationships" xmlns:p="http://schemas.openxmlformats.org/presentationml/2006/main">
+  <p:cSld>
+    <p:spTree>
+      <p:nvGrpSpPr>
+        <p:cNvPr id="1" name=""/>
+        <p:cNvGrpSpPr/>
+        <p:nvPr/>
+      </p:nvGrpSpPr>
+      <p:grpSpPr>
+        <a:xfrm>
+          <a:off x="0" y="0"/>
+          <a:ext cx="0" cy="0"/>
+          <a:chOff x="0" y="0"/>
+          <a:chExt cx="0" cy="0"/>
+        </a:xfrm>
+      </p:grpSpPr>
+      <p:sp>
+        <p:nvSpPr>
+          <p:cNvPr id="2" name="Titolo 1">
+            <a:extLst>
+              <a:ext uri="{FF2B5EF4-FFF2-40B4-BE49-F238E27FC236}">
                 <a16:creationId xmlns:a16="http://schemas.microsoft.com/office/drawing/2014/main" id="{0C4603AF-F8FA-57AD-3189-8993A6EAB4AE}"/>
               </a:ext>
             </a:extLst>
@@ -5192,7 +7368,7 @@
             <a:fld id="{07ED6331-BE36-4EB0-BAD8-FC72B96BFAEC}" type="slidenum">
               <a:rPr lang="it-IT" smtClean="0"/>
               <a:pPr/>
-              <a:t>14</a:t>
+              <a:t>18</a:t>
             </a:fld>
             <a:endParaRPr lang="it-IT"/>
           </a:p>
@@ -7761,14 +9937,13 @@
               </a:ext>
             </a:extLst>
           </a:blip>
-          <a:stretch>
-            <a:fillRect/>
-          </a:stretch>
+          <a:srcRect/>
+          <a:stretch/>
         </p:blipFill>
         <p:spPr>
           <a:xfrm>
             <a:off x="6172202" y="890791"/>
-            <a:ext cx="5341664" cy="5076417"/>
+            <a:ext cx="5341663" cy="5076417"/>
           </a:xfrm>
         </p:spPr>
       </p:pic>

</xml_diff>